<commit_message>
Update: latest local changes
</commit_message>
<xml_diff>
--- a/Figures/Figure_3.pptx
+++ b/Figures/Figure_3.pptx
@@ -2,12 +2,12 @@
 <file path=ppt/presentation.xml><?xml version="1.0" encoding="utf-8"?>
 <p:presentation xmlns:a="http://schemas.openxmlformats.org/drawingml/2006/main" xmlns:r="http://schemas.openxmlformats.org/officeDocument/2006/relationships" xmlns:p="http://schemas.openxmlformats.org/presentationml/2006/main" saveSubsetFonts="1">
   <p:sldMasterIdLst>
-    <p:sldMasterId id="2147483684" r:id="rId1"/>
+    <p:sldMasterId id="2147483696" r:id="rId1"/>
   </p:sldMasterIdLst>
   <p:sldIdLst>
     <p:sldId id="258" r:id="rId2"/>
   </p:sldIdLst>
-  <p:sldSz cx="8137525" cy="6858000"/>
+  <p:sldSz cx="8137525" cy="4572000"/>
   <p:notesSz cx="6858000" cy="9144000"/>
   <p:defaultTextStyle>
     <a:defPPr>
@@ -141,15 +141,15 @@
         </p:nvSpPr>
         <p:spPr>
           <a:xfrm>
-            <a:off x="610315" y="1122363"/>
-            <a:ext cx="6916896" cy="2387600"/>
+            <a:off x="1017191" y="748242"/>
+            <a:ext cx="6103144" cy="1591733"/>
           </a:xfrm>
         </p:spPr>
         <p:txBody>
           <a:bodyPr anchor="b"/>
           <a:lstStyle>
             <a:lvl1pPr algn="ctr">
-              <a:defRPr sz="5339"/>
+              <a:defRPr sz="4000"/>
             </a:lvl1pPr>
           </a:lstStyle>
           <a:p>
@@ -173,8 +173,8 @@
         </p:nvSpPr>
         <p:spPr>
           <a:xfrm>
-            <a:off x="1017191" y="3602038"/>
-            <a:ext cx="6103144" cy="1655762"/>
+            <a:off x="1017191" y="2401359"/>
+            <a:ext cx="6103144" cy="1103841"/>
           </a:xfrm>
         </p:spPr>
         <p:txBody>
@@ -182,39 +182,39 @@
           <a:lstStyle>
             <a:lvl1pPr marL="0" indent="0" algn="ctr">
               <a:buNone/>
-              <a:defRPr sz="2136"/>
+              <a:defRPr sz="1600"/>
             </a:lvl1pPr>
-            <a:lvl2pPr marL="406862" indent="0" algn="ctr">
-              <a:buNone/>
-              <a:defRPr sz="1780"/>
+            <a:lvl2pPr marL="304815" indent="0" algn="ctr">
+              <a:buNone/>
+              <a:defRPr sz="1333"/>
             </a:lvl2pPr>
-            <a:lvl3pPr marL="813725" indent="0" algn="ctr">
-              <a:buNone/>
-              <a:defRPr sz="1602"/>
+            <a:lvl3pPr marL="609630" indent="0" algn="ctr">
+              <a:buNone/>
+              <a:defRPr sz="1200"/>
             </a:lvl3pPr>
-            <a:lvl4pPr marL="1220587" indent="0" algn="ctr">
-              <a:buNone/>
-              <a:defRPr sz="1424"/>
+            <a:lvl4pPr marL="914446" indent="0" algn="ctr">
+              <a:buNone/>
+              <a:defRPr sz="1067"/>
             </a:lvl4pPr>
-            <a:lvl5pPr marL="1627449" indent="0" algn="ctr">
-              <a:buNone/>
-              <a:defRPr sz="1424"/>
+            <a:lvl5pPr marL="1219261" indent="0" algn="ctr">
+              <a:buNone/>
+              <a:defRPr sz="1067"/>
             </a:lvl5pPr>
-            <a:lvl6pPr marL="2034311" indent="0" algn="ctr">
-              <a:buNone/>
-              <a:defRPr sz="1424"/>
+            <a:lvl6pPr marL="1524076" indent="0" algn="ctr">
+              <a:buNone/>
+              <a:defRPr sz="1067"/>
             </a:lvl6pPr>
-            <a:lvl7pPr marL="2441174" indent="0" algn="ctr">
-              <a:buNone/>
-              <a:defRPr sz="1424"/>
+            <a:lvl7pPr marL="1828891" indent="0" algn="ctr">
+              <a:buNone/>
+              <a:defRPr sz="1067"/>
             </a:lvl7pPr>
-            <a:lvl8pPr marL="2848036" indent="0" algn="ctr">
-              <a:buNone/>
-              <a:defRPr sz="1424"/>
+            <a:lvl8pPr marL="2133707" indent="0" algn="ctr">
+              <a:buNone/>
+              <a:defRPr sz="1067"/>
             </a:lvl8pPr>
-            <a:lvl9pPr marL="3254898" indent="0" algn="ctr">
-              <a:buNone/>
-              <a:defRPr sz="1424"/>
+            <a:lvl9pPr marL="2438522" indent="0" algn="ctr">
+              <a:buNone/>
+              <a:defRPr sz="1067"/>
             </a:lvl9pPr>
           </a:lstStyle>
           <a:p>
@@ -243,7 +243,7 @@
           <a:p>
             <a:fld id="{C4EF3122-51AB-46F6-A64E-83495DCDC288}" type="datetimeFigureOut">
               <a:rPr lang="en-US" smtClean="0"/>
-              <a:t>9/5/2025</a:t>
+              <a:t>9/28/2025</a:t>
             </a:fld>
             <a:endParaRPr lang="en-US"/>
           </a:p>
@@ -294,7 +294,7 @@
     </p:spTree>
     <p:extLst>
       <p:ext uri="{BB962C8B-B14F-4D97-AF65-F5344CB8AC3E}">
-        <p14:creationId xmlns:p14="http://schemas.microsoft.com/office/powerpoint/2010/main" val="41660072"/>
+        <p14:creationId xmlns:p14="http://schemas.microsoft.com/office/powerpoint/2010/main" val="996501275"/>
       </p:ext>
     </p:extLst>
   </p:cSld>
@@ -413,7 +413,7 @@
           <a:p>
             <a:fld id="{C4EF3122-51AB-46F6-A64E-83495DCDC288}" type="datetimeFigureOut">
               <a:rPr lang="en-US" smtClean="0"/>
-              <a:t>9/5/2025</a:t>
+              <a:t>9/28/2025</a:t>
             </a:fld>
             <a:endParaRPr lang="en-US"/>
           </a:p>
@@ -464,7 +464,7 @@
     </p:spTree>
     <p:extLst>
       <p:ext uri="{BB962C8B-B14F-4D97-AF65-F5344CB8AC3E}">
-        <p14:creationId xmlns:p14="http://schemas.microsoft.com/office/powerpoint/2010/main" val="2492221484"/>
+        <p14:creationId xmlns:p14="http://schemas.microsoft.com/office/powerpoint/2010/main" val="1036875448"/>
       </p:ext>
     </p:extLst>
   </p:cSld>
@@ -503,8 +503,8 @@
         </p:nvSpPr>
         <p:spPr>
           <a:xfrm>
-            <a:off x="5823417" y="365125"/>
-            <a:ext cx="1754654" cy="5811838"/>
+            <a:off x="5823416" y="243417"/>
+            <a:ext cx="1754654" cy="3874559"/>
           </a:xfrm>
         </p:spPr>
         <p:txBody>
@@ -531,8 +531,8 @@
         </p:nvSpPr>
         <p:spPr>
           <a:xfrm>
-            <a:off x="559455" y="365125"/>
-            <a:ext cx="5162242" cy="5811838"/>
+            <a:off x="559455" y="243417"/>
+            <a:ext cx="5162242" cy="3874559"/>
           </a:xfrm>
         </p:spPr>
         <p:txBody>
@@ -593,7 +593,7 @@
           <a:p>
             <a:fld id="{C4EF3122-51AB-46F6-A64E-83495DCDC288}" type="datetimeFigureOut">
               <a:rPr lang="en-US" smtClean="0"/>
-              <a:t>9/5/2025</a:t>
+              <a:t>9/28/2025</a:t>
             </a:fld>
             <a:endParaRPr lang="en-US"/>
           </a:p>
@@ -644,7 +644,7 @@
     </p:spTree>
     <p:extLst>
       <p:ext uri="{BB962C8B-B14F-4D97-AF65-F5344CB8AC3E}">
-        <p14:creationId xmlns:p14="http://schemas.microsoft.com/office/powerpoint/2010/main" val="3105183755"/>
+        <p14:creationId xmlns:p14="http://schemas.microsoft.com/office/powerpoint/2010/main" val="754463914"/>
       </p:ext>
     </p:extLst>
   </p:cSld>
@@ -763,7 +763,7 @@
           <a:p>
             <a:fld id="{C4EF3122-51AB-46F6-A64E-83495DCDC288}" type="datetimeFigureOut">
               <a:rPr lang="en-US" smtClean="0"/>
-              <a:t>9/5/2025</a:t>
+              <a:t>9/28/2025</a:t>
             </a:fld>
             <a:endParaRPr lang="en-US"/>
           </a:p>
@@ -814,7 +814,7 @@
     </p:spTree>
     <p:extLst>
       <p:ext uri="{BB962C8B-B14F-4D97-AF65-F5344CB8AC3E}">
-        <p14:creationId xmlns:p14="http://schemas.microsoft.com/office/powerpoint/2010/main" val="3004613717"/>
+        <p14:creationId xmlns:p14="http://schemas.microsoft.com/office/powerpoint/2010/main" val="2653172604"/>
       </p:ext>
     </p:extLst>
   </p:cSld>
@@ -853,15 +853,15 @@
         </p:nvSpPr>
         <p:spPr>
           <a:xfrm>
-            <a:off x="555217" y="1709740"/>
-            <a:ext cx="7018615" cy="2852737"/>
+            <a:off x="555217" y="1139826"/>
+            <a:ext cx="7018615" cy="1901825"/>
           </a:xfrm>
         </p:spPr>
         <p:txBody>
           <a:bodyPr anchor="b"/>
           <a:lstStyle>
             <a:lvl1pPr>
-              <a:defRPr sz="5339"/>
+              <a:defRPr sz="4000"/>
             </a:lvl1pPr>
           </a:lstStyle>
           <a:p>
@@ -885,8 +885,8 @@
         </p:nvSpPr>
         <p:spPr>
           <a:xfrm>
-            <a:off x="555217" y="4589465"/>
-            <a:ext cx="7018615" cy="1500187"/>
+            <a:off x="555217" y="3059642"/>
+            <a:ext cx="7018615" cy="1000125"/>
           </a:xfrm>
         </p:spPr>
         <p:txBody>
@@ -894,7 +894,7 @@
           <a:lstStyle>
             <a:lvl1pPr marL="0" indent="0">
               <a:buNone/>
-              <a:defRPr sz="2136">
+              <a:defRPr sz="1600">
                 <a:solidFill>
                   <a:schemeClr val="tx1">
                     <a:tint val="82000"/>
@@ -902,9 +902,9 @@
                 </a:solidFill>
               </a:defRPr>
             </a:lvl1pPr>
-            <a:lvl2pPr marL="406862" indent="0">
-              <a:buNone/>
-              <a:defRPr sz="1780">
+            <a:lvl2pPr marL="304815" indent="0">
+              <a:buNone/>
+              <a:defRPr sz="1333">
                 <a:solidFill>
                   <a:schemeClr val="tx1">
                     <a:tint val="82000"/>
@@ -912,9 +912,9 @@
                 </a:solidFill>
               </a:defRPr>
             </a:lvl2pPr>
-            <a:lvl3pPr marL="813725" indent="0">
-              <a:buNone/>
-              <a:defRPr sz="1602">
+            <a:lvl3pPr marL="609630" indent="0">
+              <a:buNone/>
+              <a:defRPr sz="1200">
                 <a:solidFill>
                   <a:schemeClr val="tx1">
                     <a:tint val="82000"/>
@@ -922,9 +922,9 @@
                 </a:solidFill>
               </a:defRPr>
             </a:lvl3pPr>
-            <a:lvl4pPr marL="1220587" indent="0">
-              <a:buNone/>
-              <a:defRPr sz="1424">
+            <a:lvl4pPr marL="914446" indent="0">
+              <a:buNone/>
+              <a:defRPr sz="1067">
                 <a:solidFill>
                   <a:schemeClr val="tx1">
                     <a:tint val="82000"/>
@@ -932,9 +932,9 @@
                 </a:solidFill>
               </a:defRPr>
             </a:lvl4pPr>
-            <a:lvl5pPr marL="1627449" indent="0">
-              <a:buNone/>
-              <a:defRPr sz="1424">
+            <a:lvl5pPr marL="1219261" indent="0">
+              <a:buNone/>
+              <a:defRPr sz="1067">
                 <a:solidFill>
                   <a:schemeClr val="tx1">
                     <a:tint val="82000"/>
@@ -942,9 +942,9 @@
                 </a:solidFill>
               </a:defRPr>
             </a:lvl5pPr>
-            <a:lvl6pPr marL="2034311" indent="0">
-              <a:buNone/>
-              <a:defRPr sz="1424">
+            <a:lvl6pPr marL="1524076" indent="0">
+              <a:buNone/>
+              <a:defRPr sz="1067">
                 <a:solidFill>
                   <a:schemeClr val="tx1">
                     <a:tint val="82000"/>
@@ -952,9 +952,9 @@
                 </a:solidFill>
               </a:defRPr>
             </a:lvl6pPr>
-            <a:lvl7pPr marL="2441174" indent="0">
-              <a:buNone/>
-              <a:defRPr sz="1424">
+            <a:lvl7pPr marL="1828891" indent="0">
+              <a:buNone/>
+              <a:defRPr sz="1067">
                 <a:solidFill>
                   <a:schemeClr val="tx1">
                     <a:tint val="82000"/>
@@ -962,9 +962,9 @@
                 </a:solidFill>
               </a:defRPr>
             </a:lvl7pPr>
-            <a:lvl8pPr marL="2848036" indent="0">
-              <a:buNone/>
-              <a:defRPr sz="1424">
+            <a:lvl8pPr marL="2133707" indent="0">
+              <a:buNone/>
+              <a:defRPr sz="1067">
                 <a:solidFill>
                   <a:schemeClr val="tx1">
                     <a:tint val="82000"/>
@@ -972,9 +972,9 @@
                 </a:solidFill>
               </a:defRPr>
             </a:lvl8pPr>
-            <a:lvl9pPr marL="3254898" indent="0">
-              <a:buNone/>
-              <a:defRPr sz="1424">
+            <a:lvl9pPr marL="2438522" indent="0">
+              <a:buNone/>
+              <a:defRPr sz="1067">
                 <a:solidFill>
                   <a:schemeClr val="tx1">
                     <a:tint val="82000"/>
@@ -1009,7 +1009,7 @@
           <a:p>
             <a:fld id="{C4EF3122-51AB-46F6-A64E-83495DCDC288}" type="datetimeFigureOut">
               <a:rPr lang="en-US" smtClean="0"/>
-              <a:t>9/5/2025</a:t>
+              <a:t>9/28/2025</a:t>
             </a:fld>
             <a:endParaRPr lang="en-US"/>
           </a:p>
@@ -1060,7 +1060,7 @@
     </p:spTree>
     <p:extLst>
       <p:ext uri="{BB962C8B-B14F-4D97-AF65-F5344CB8AC3E}">
-        <p14:creationId xmlns:p14="http://schemas.microsoft.com/office/powerpoint/2010/main" val="1337965891"/>
+        <p14:creationId xmlns:p14="http://schemas.microsoft.com/office/powerpoint/2010/main" val="2055942188"/>
       </p:ext>
     </p:extLst>
   </p:cSld>
@@ -1122,8 +1122,8 @@
         </p:nvSpPr>
         <p:spPr>
           <a:xfrm>
-            <a:off x="559455" y="1825625"/>
-            <a:ext cx="3458448" cy="4351338"/>
+            <a:off x="559455" y="1217083"/>
+            <a:ext cx="3458448" cy="2900892"/>
           </a:xfrm>
         </p:spPr>
         <p:txBody>
@@ -1179,8 +1179,8 @@
         </p:nvSpPr>
         <p:spPr>
           <a:xfrm>
-            <a:off x="4119622" y="1825625"/>
-            <a:ext cx="3458448" cy="4351338"/>
+            <a:off x="4119622" y="1217083"/>
+            <a:ext cx="3458448" cy="2900892"/>
           </a:xfrm>
         </p:spPr>
         <p:txBody>
@@ -1241,7 +1241,7 @@
           <a:p>
             <a:fld id="{C4EF3122-51AB-46F6-A64E-83495DCDC288}" type="datetimeFigureOut">
               <a:rPr lang="en-US" smtClean="0"/>
-              <a:t>9/5/2025</a:t>
+              <a:t>9/28/2025</a:t>
             </a:fld>
             <a:endParaRPr lang="en-US"/>
           </a:p>
@@ -1292,7 +1292,7 @@
     </p:spTree>
     <p:extLst>
       <p:ext uri="{BB962C8B-B14F-4D97-AF65-F5344CB8AC3E}">
-        <p14:creationId xmlns:p14="http://schemas.microsoft.com/office/powerpoint/2010/main" val="113496225"/>
+        <p14:creationId xmlns:p14="http://schemas.microsoft.com/office/powerpoint/2010/main" val="1438442863"/>
       </p:ext>
     </p:extLst>
   </p:cSld>
@@ -1331,8 +1331,8 @@
         </p:nvSpPr>
         <p:spPr>
           <a:xfrm>
-            <a:off x="560515" y="365127"/>
-            <a:ext cx="7018615" cy="1325563"/>
+            <a:off x="560515" y="243417"/>
+            <a:ext cx="7018615" cy="883709"/>
           </a:xfrm>
         </p:spPr>
         <p:txBody>
@@ -1359,8 +1359,8 @@
         </p:nvSpPr>
         <p:spPr>
           <a:xfrm>
-            <a:off x="560516" y="1681163"/>
-            <a:ext cx="3442554" cy="823912"/>
+            <a:off x="560515" y="1120775"/>
+            <a:ext cx="3442554" cy="549275"/>
           </a:xfrm>
         </p:spPr>
         <p:txBody>
@@ -1368,39 +1368,39 @@
           <a:lstStyle>
             <a:lvl1pPr marL="0" indent="0">
               <a:buNone/>
-              <a:defRPr sz="2136" b="1"/>
+              <a:defRPr sz="1600" b="1"/>
             </a:lvl1pPr>
-            <a:lvl2pPr marL="406862" indent="0">
-              <a:buNone/>
-              <a:defRPr sz="1780" b="1"/>
+            <a:lvl2pPr marL="304815" indent="0">
+              <a:buNone/>
+              <a:defRPr sz="1333" b="1"/>
             </a:lvl2pPr>
-            <a:lvl3pPr marL="813725" indent="0">
-              <a:buNone/>
-              <a:defRPr sz="1602" b="1"/>
+            <a:lvl3pPr marL="609630" indent="0">
+              <a:buNone/>
+              <a:defRPr sz="1200" b="1"/>
             </a:lvl3pPr>
-            <a:lvl4pPr marL="1220587" indent="0">
-              <a:buNone/>
-              <a:defRPr sz="1424" b="1"/>
+            <a:lvl4pPr marL="914446" indent="0">
+              <a:buNone/>
+              <a:defRPr sz="1067" b="1"/>
             </a:lvl4pPr>
-            <a:lvl5pPr marL="1627449" indent="0">
-              <a:buNone/>
-              <a:defRPr sz="1424" b="1"/>
+            <a:lvl5pPr marL="1219261" indent="0">
+              <a:buNone/>
+              <a:defRPr sz="1067" b="1"/>
             </a:lvl5pPr>
-            <a:lvl6pPr marL="2034311" indent="0">
-              <a:buNone/>
-              <a:defRPr sz="1424" b="1"/>
+            <a:lvl6pPr marL="1524076" indent="0">
+              <a:buNone/>
+              <a:defRPr sz="1067" b="1"/>
             </a:lvl6pPr>
-            <a:lvl7pPr marL="2441174" indent="0">
-              <a:buNone/>
-              <a:defRPr sz="1424" b="1"/>
+            <a:lvl7pPr marL="1828891" indent="0">
+              <a:buNone/>
+              <a:defRPr sz="1067" b="1"/>
             </a:lvl7pPr>
-            <a:lvl8pPr marL="2848036" indent="0">
-              <a:buNone/>
-              <a:defRPr sz="1424" b="1"/>
+            <a:lvl8pPr marL="2133707" indent="0">
+              <a:buNone/>
+              <a:defRPr sz="1067" b="1"/>
             </a:lvl8pPr>
-            <a:lvl9pPr marL="3254898" indent="0">
-              <a:buNone/>
-              <a:defRPr sz="1424" b="1"/>
+            <a:lvl9pPr marL="2438522" indent="0">
+              <a:buNone/>
+              <a:defRPr sz="1067" b="1"/>
             </a:lvl9pPr>
           </a:lstStyle>
           <a:p>
@@ -1424,8 +1424,8 @@
         </p:nvSpPr>
         <p:spPr>
           <a:xfrm>
-            <a:off x="560516" y="2505075"/>
-            <a:ext cx="3442554" cy="3684588"/>
+            <a:off x="560515" y="1670050"/>
+            <a:ext cx="3442554" cy="2456392"/>
           </a:xfrm>
         </p:spPr>
         <p:txBody>
@@ -1481,8 +1481,8 @@
         </p:nvSpPr>
         <p:spPr>
           <a:xfrm>
-            <a:off x="4119622" y="1681163"/>
-            <a:ext cx="3459508" cy="823912"/>
+            <a:off x="4119622" y="1120775"/>
+            <a:ext cx="3459508" cy="549275"/>
           </a:xfrm>
         </p:spPr>
         <p:txBody>
@@ -1490,39 +1490,39 @@
           <a:lstStyle>
             <a:lvl1pPr marL="0" indent="0">
               <a:buNone/>
-              <a:defRPr sz="2136" b="1"/>
+              <a:defRPr sz="1600" b="1"/>
             </a:lvl1pPr>
-            <a:lvl2pPr marL="406862" indent="0">
-              <a:buNone/>
-              <a:defRPr sz="1780" b="1"/>
+            <a:lvl2pPr marL="304815" indent="0">
+              <a:buNone/>
+              <a:defRPr sz="1333" b="1"/>
             </a:lvl2pPr>
-            <a:lvl3pPr marL="813725" indent="0">
-              <a:buNone/>
-              <a:defRPr sz="1602" b="1"/>
+            <a:lvl3pPr marL="609630" indent="0">
+              <a:buNone/>
+              <a:defRPr sz="1200" b="1"/>
             </a:lvl3pPr>
-            <a:lvl4pPr marL="1220587" indent="0">
-              <a:buNone/>
-              <a:defRPr sz="1424" b="1"/>
+            <a:lvl4pPr marL="914446" indent="0">
+              <a:buNone/>
+              <a:defRPr sz="1067" b="1"/>
             </a:lvl4pPr>
-            <a:lvl5pPr marL="1627449" indent="0">
-              <a:buNone/>
-              <a:defRPr sz="1424" b="1"/>
+            <a:lvl5pPr marL="1219261" indent="0">
+              <a:buNone/>
+              <a:defRPr sz="1067" b="1"/>
             </a:lvl5pPr>
-            <a:lvl6pPr marL="2034311" indent="0">
-              <a:buNone/>
-              <a:defRPr sz="1424" b="1"/>
+            <a:lvl6pPr marL="1524076" indent="0">
+              <a:buNone/>
+              <a:defRPr sz="1067" b="1"/>
             </a:lvl6pPr>
-            <a:lvl7pPr marL="2441174" indent="0">
-              <a:buNone/>
-              <a:defRPr sz="1424" b="1"/>
+            <a:lvl7pPr marL="1828891" indent="0">
+              <a:buNone/>
+              <a:defRPr sz="1067" b="1"/>
             </a:lvl7pPr>
-            <a:lvl8pPr marL="2848036" indent="0">
-              <a:buNone/>
-              <a:defRPr sz="1424" b="1"/>
+            <a:lvl8pPr marL="2133707" indent="0">
+              <a:buNone/>
+              <a:defRPr sz="1067" b="1"/>
             </a:lvl8pPr>
-            <a:lvl9pPr marL="3254898" indent="0">
-              <a:buNone/>
-              <a:defRPr sz="1424" b="1"/>
+            <a:lvl9pPr marL="2438522" indent="0">
+              <a:buNone/>
+              <a:defRPr sz="1067" b="1"/>
             </a:lvl9pPr>
           </a:lstStyle>
           <a:p>
@@ -1546,8 +1546,8 @@
         </p:nvSpPr>
         <p:spPr>
           <a:xfrm>
-            <a:off x="4119622" y="2505075"/>
-            <a:ext cx="3459508" cy="3684588"/>
+            <a:off x="4119622" y="1670050"/>
+            <a:ext cx="3459508" cy="2456392"/>
           </a:xfrm>
         </p:spPr>
         <p:txBody>
@@ -1608,7 +1608,7 @@
           <a:p>
             <a:fld id="{C4EF3122-51AB-46F6-A64E-83495DCDC288}" type="datetimeFigureOut">
               <a:rPr lang="en-US" smtClean="0"/>
-              <a:t>9/5/2025</a:t>
+              <a:t>9/28/2025</a:t>
             </a:fld>
             <a:endParaRPr lang="en-US"/>
           </a:p>
@@ -1659,7 +1659,7 @@
     </p:spTree>
     <p:extLst>
       <p:ext uri="{BB962C8B-B14F-4D97-AF65-F5344CB8AC3E}">
-        <p14:creationId xmlns:p14="http://schemas.microsoft.com/office/powerpoint/2010/main" val="3897834427"/>
+        <p14:creationId xmlns:p14="http://schemas.microsoft.com/office/powerpoint/2010/main" val="3095908055"/>
       </p:ext>
     </p:extLst>
   </p:cSld>
@@ -1726,7 +1726,7 @@
           <a:p>
             <a:fld id="{C4EF3122-51AB-46F6-A64E-83495DCDC288}" type="datetimeFigureOut">
               <a:rPr lang="en-US" smtClean="0"/>
-              <a:t>9/5/2025</a:t>
+              <a:t>9/28/2025</a:t>
             </a:fld>
             <a:endParaRPr lang="en-US"/>
           </a:p>
@@ -1777,7 +1777,7 @@
     </p:spTree>
     <p:extLst>
       <p:ext uri="{BB962C8B-B14F-4D97-AF65-F5344CB8AC3E}">
-        <p14:creationId xmlns:p14="http://schemas.microsoft.com/office/powerpoint/2010/main" val="2697701179"/>
+        <p14:creationId xmlns:p14="http://schemas.microsoft.com/office/powerpoint/2010/main" val="72287199"/>
       </p:ext>
     </p:extLst>
   </p:cSld>
@@ -1821,7 +1821,7 @@
           <a:p>
             <a:fld id="{C4EF3122-51AB-46F6-A64E-83495DCDC288}" type="datetimeFigureOut">
               <a:rPr lang="en-US" smtClean="0"/>
-              <a:t>9/5/2025</a:t>
+              <a:t>9/28/2025</a:t>
             </a:fld>
             <a:endParaRPr lang="en-US"/>
           </a:p>
@@ -1872,7 +1872,7 @@
     </p:spTree>
     <p:extLst>
       <p:ext uri="{BB962C8B-B14F-4D97-AF65-F5344CB8AC3E}">
-        <p14:creationId xmlns:p14="http://schemas.microsoft.com/office/powerpoint/2010/main" val="1478457842"/>
+        <p14:creationId xmlns:p14="http://schemas.microsoft.com/office/powerpoint/2010/main" val="2582027667"/>
       </p:ext>
     </p:extLst>
   </p:cSld>
@@ -1911,15 +1911,15 @@
         </p:nvSpPr>
         <p:spPr>
           <a:xfrm>
-            <a:off x="560515" y="457200"/>
-            <a:ext cx="2624564" cy="1600200"/>
+            <a:off x="560515" y="304800"/>
+            <a:ext cx="2624563" cy="1066800"/>
           </a:xfrm>
         </p:spPr>
         <p:txBody>
           <a:bodyPr anchor="b"/>
           <a:lstStyle>
             <a:lvl1pPr>
-              <a:defRPr sz="2848"/>
+              <a:defRPr sz="2133"/>
             </a:lvl1pPr>
           </a:lstStyle>
           <a:p>
@@ -1943,39 +1943,39 @@
         </p:nvSpPr>
         <p:spPr>
           <a:xfrm>
-            <a:off x="3459508" y="987427"/>
-            <a:ext cx="4119622" cy="4873625"/>
+            <a:off x="3459508" y="658284"/>
+            <a:ext cx="4119622" cy="3249083"/>
           </a:xfrm>
         </p:spPr>
         <p:txBody>
           <a:bodyPr/>
           <a:lstStyle>
             <a:lvl1pPr>
-              <a:defRPr sz="2848"/>
+              <a:defRPr sz="2133"/>
             </a:lvl1pPr>
             <a:lvl2pPr>
-              <a:defRPr sz="2492"/>
+              <a:defRPr sz="1867"/>
             </a:lvl2pPr>
             <a:lvl3pPr>
-              <a:defRPr sz="2136"/>
+              <a:defRPr sz="1600"/>
             </a:lvl3pPr>
             <a:lvl4pPr>
-              <a:defRPr sz="1780"/>
+              <a:defRPr sz="1333"/>
             </a:lvl4pPr>
             <a:lvl5pPr>
-              <a:defRPr sz="1780"/>
+              <a:defRPr sz="1333"/>
             </a:lvl5pPr>
             <a:lvl6pPr>
-              <a:defRPr sz="1780"/>
+              <a:defRPr sz="1333"/>
             </a:lvl6pPr>
             <a:lvl7pPr>
-              <a:defRPr sz="1780"/>
+              <a:defRPr sz="1333"/>
             </a:lvl7pPr>
             <a:lvl8pPr>
-              <a:defRPr sz="1780"/>
+              <a:defRPr sz="1333"/>
             </a:lvl8pPr>
             <a:lvl9pPr>
-              <a:defRPr sz="1780"/>
+              <a:defRPr sz="1333"/>
             </a:lvl9pPr>
           </a:lstStyle>
           <a:p>
@@ -2028,8 +2028,8 @@
         </p:nvSpPr>
         <p:spPr>
           <a:xfrm>
-            <a:off x="560515" y="2057400"/>
-            <a:ext cx="2624564" cy="3811588"/>
+            <a:off x="560515" y="1371600"/>
+            <a:ext cx="2624563" cy="2541059"/>
           </a:xfrm>
         </p:spPr>
         <p:txBody>
@@ -2037,39 +2037,39 @@
           <a:lstStyle>
             <a:lvl1pPr marL="0" indent="0">
               <a:buNone/>
-              <a:defRPr sz="1424"/>
+              <a:defRPr sz="1067"/>
             </a:lvl1pPr>
-            <a:lvl2pPr marL="406862" indent="0">
-              <a:buNone/>
-              <a:defRPr sz="1246"/>
+            <a:lvl2pPr marL="304815" indent="0">
+              <a:buNone/>
+              <a:defRPr sz="933"/>
             </a:lvl2pPr>
-            <a:lvl3pPr marL="813725" indent="0">
-              <a:buNone/>
-              <a:defRPr sz="1068"/>
+            <a:lvl3pPr marL="609630" indent="0">
+              <a:buNone/>
+              <a:defRPr sz="800"/>
             </a:lvl3pPr>
-            <a:lvl4pPr marL="1220587" indent="0">
-              <a:buNone/>
-              <a:defRPr sz="890"/>
+            <a:lvl4pPr marL="914446" indent="0">
+              <a:buNone/>
+              <a:defRPr sz="667"/>
             </a:lvl4pPr>
-            <a:lvl5pPr marL="1627449" indent="0">
-              <a:buNone/>
-              <a:defRPr sz="890"/>
+            <a:lvl5pPr marL="1219261" indent="0">
+              <a:buNone/>
+              <a:defRPr sz="667"/>
             </a:lvl5pPr>
-            <a:lvl6pPr marL="2034311" indent="0">
-              <a:buNone/>
-              <a:defRPr sz="890"/>
+            <a:lvl6pPr marL="1524076" indent="0">
+              <a:buNone/>
+              <a:defRPr sz="667"/>
             </a:lvl6pPr>
-            <a:lvl7pPr marL="2441174" indent="0">
-              <a:buNone/>
-              <a:defRPr sz="890"/>
+            <a:lvl7pPr marL="1828891" indent="0">
+              <a:buNone/>
+              <a:defRPr sz="667"/>
             </a:lvl7pPr>
-            <a:lvl8pPr marL="2848036" indent="0">
-              <a:buNone/>
-              <a:defRPr sz="890"/>
+            <a:lvl8pPr marL="2133707" indent="0">
+              <a:buNone/>
+              <a:defRPr sz="667"/>
             </a:lvl8pPr>
-            <a:lvl9pPr marL="3254898" indent="0">
-              <a:buNone/>
-              <a:defRPr sz="890"/>
+            <a:lvl9pPr marL="2438522" indent="0">
+              <a:buNone/>
+              <a:defRPr sz="667"/>
             </a:lvl9pPr>
           </a:lstStyle>
           <a:p>
@@ -2098,7 +2098,7 @@
           <a:p>
             <a:fld id="{C4EF3122-51AB-46F6-A64E-83495DCDC288}" type="datetimeFigureOut">
               <a:rPr lang="en-US" smtClean="0"/>
-              <a:t>9/5/2025</a:t>
+              <a:t>9/28/2025</a:t>
             </a:fld>
             <a:endParaRPr lang="en-US"/>
           </a:p>
@@ -2149,7 +2149,7 @@
     </p:spTree>
     <p:extLst>
       <p:ext uri="{BB962C8B-B14F-4D97-AF65-F5344CB8AC3E}">
-        <p14:creationId xmlns:p14="http://schemas.microsoft.com/office/powerpoint/2010/main" val="2135740227"/>
+        <p14:creationId xmlns:p14="http://schemas.microsoft.com/office/powerpoint/2010/main" val="1853036186"/>
       </p:ext>
     </p:extLst>
   </p:cSld>
@@ -2188,15 +2188,15 @@
         </p:nvSpPr>
         <p:spPr>
           <a:xfrm>
-            <a:off x="560515" y="457200"/>
-            <a:ext cx="2624564" cy="1600200"/>
+            <a:off x="560515" y="304800"/>
+            <a:ext cx="2624563" cy="1066800"/>
           </a:xfrm>
         </p:spPr>
         <p:txBody>
           <a:bodyPr anchor="b"/>
           <a:lstStyle>
             <a:lvl1pPr>
-              <a:defRPr sz="2848"/>
+              <a:defRPr sz="2133"/>
             </a:lvl1pPr>
           </a:lstStyle>
           <a:p>
@@ -2220,8 +2220,8 @@
         </p:nvSpPr>
         <p:spPr>
           <a:xfrm>
-            <a:off x="3459508" y="987427"/>
-            <a:ext cx="4119622" cy="4873625"/>
+            <a:off x="3459508" y="658284"/>
+            <a:ext cx="4119622" cy="3249083"/>
           </a:xfrm>
         </p:spPr>
         <p:txBody>
@@ -2229,39 +2229,39 @@
           <a:lstStyle>
             <a:lvl1pPr marL="0" indent="0">
               <a:buNone/>
-              <a:defRPr sz="2848"/>
+              <a:defRPr sz="2133"/>
             </a:lvl1pPr>
-            <a:lvl2pPr marL="406862" indent="0">
-              <a:buNone/>
-              <a:defRPr sz="2492"/>
+            <a:lvl2pPr marL="304815" indent="0">
+              <a:buNone/>
+              <a:defRPr sz="1867"/>
             </a:lvl2pPr>
-            <a:lvl3pPr marL="813725" indent="0">
-              <a:buNone/>
-              <a:defRPr sz="2136"/>
+            <a:lvl3pPr marL="609630" indent="0">
+              <a:buNone/>
+              <a:defRPr sz="1600"/>
             </a:lvl3pPr>
-            <a:lvl4pPr marL="1220587" indent="0">
-              <a:buNone/>
-              <a:defRPr sz="1780"/>
+            <a:lvl4pPr marL="914446" indent="0">
+              <a:buNone/>
+              <a:defRPr sz="1333"/>
             </a:lvl4pPr>
-            <a:lvl5pPr marL="1627449" indent="0">
-              <a:buNone/>
-              <a:defRPr sz="1780"/>
+            <a:lvl5pPr marL="1219261" indent="0">
+              <a:buNone/>
+              <a:defRPr sz="1333"/>
             </a:lvl5pPr>
-            <a:lvl6pPr marL="2034311" indent="0">
-              <a:buNone/>
-              <a:defRPr sz="1780"/>
+            <a:lvl6pPr marL="1524076" indent="0">
+              <a:buNone/>
+              <a:defRPr sz="1333"/>
             </a:lvl6pPr>
-            <a:lvl7pPr marL="2441174" indent="0">
-              <a:buNone/>
-              <a:defRPr sz="1780"/>
+            <a:lvl7pPr marL="1828891" indent="0">
+              <a:buNone/>
+              <a:defRPr sz="1333"/>
             </a:lvl7pPr>
-            <a:lvl8pPr marL="2848036" indent="0">
-              <a:buNone/>
-              <a:defRPr sz="1780"/>
+            <a:lvl8pPr marL="2133707" indent="0">
+              <a:buNone/>
+              <a:defRPr sz="1333"/>
             </a:lvl8pPr>
-            <a:lvl9pPr marL="3254898" indent="0">
-              <a:buNone/>
-              <a:defRPr sz="1780"/>
+            <a:lvl9pPr marL="2438522" indent="0">
+              <a:buNone/>
+              <a:defRPr sz="1333"/>
             </a:lvl9pPr>
           </a:lstStyle>
           <a:p>
@@ -2285,8 +2285,8 @@
         </p:nvSpPr>
         <p:spPr>
           <a:xfrm>
-            <a:off x="560515" y="2057400"/>
-            <a:ext cx="2624564" cy="3811588"/>
+            <a:off x="560515" y="1371600"/>
+            <a:ext cx="2624563" cy="2541059"/>
           </a:xfrm>
         </p:spPr>
         <p:txBody>
@@ -2294,39 +2294,39 @@
           <a:lstStyle>
             <a:lvl1pPr marL="0" indent="0">
               <a:buNone/>
-              <a:defRPr sz="1424"/>
+              <a:defRPr sz="1067"/>
             </a:lvl1pPr>
-            <a:lvl2pPr marL="406862" indent="0">
-              <a:buNone/>
-              <a:defRPr sz="1246"/>
+            <a:lvl2pPr marL="304815" indent="0">
+              <a:buNone/>
+              <a:defRPr sz="933"/>
             </a:lvl2pPr>
-            <a:lvl3pPr marL="813725" indent="0">
-              <a:buNone/>
-              <a:defRPr sz="1068"/>
+            <a:lvl3pPr marL="609630" indent="0">
+              <a:buNone/>
+              <a:defRPr sz="800"/>
             </a:lvl3pPr>
-            <a:lvl4pPr marL="1220587" indent="0">
-              <a:buNone/>
-              <a:defRPr sz="890"/>
+            <a:lvl4pPr marL="914446" indent="0">
+              <a:buNone/>
+              <a:defRPr sz="667"/>
             </a:lvl4pPr>
-            <a:lvl5pPr marL="1627449" indent="0">
-              <a:buNone/>
-              <a:defRPr sz="890"/>
+            <a:lvl5pPr marL="1219261" indent="0">
+              <a:buNone/>
+              <a:defRPr sz="667"/>
             </a:lvl5pPr>
-            <a:lvl6pPr marL="2034311" indent="0">
-              <a:buNone/>
-              <a:defRPr sz="890"/>
+            <a:lvl6pPr marL="1524076" indent="0">
+              <a:buNone/>
+              <a:defRPr sz="667"/>
             </a:lvl6pPr>
-            <a:lvl7pPr marL="2441174" indent="0">
-              <a:buNone/>
-              <a:defRPr sz="890"/>
+            <a:lvl7pPr marL="1828891" indent="0">
+              <a:buNone/>
+              <a:defRPr sz="667"/>
             </a:lvl7pPr>
-            <a:lvl8pPr marL="2848036" indent="0">
-              <a:buNone/>
-              <a:defRPr sz="890"/>
+            <a:lvl8pPr marL="2133707" indent="0">
+              <a:buNone/>
+              <a:defRPr sz="667"/>
             </a:lvl8pPr>
-            <a:lvl9pPr marL="3254898" indent="0">
-              <a:buNone/>
-              <a:defRPr sz="890"/>
+            <a:lvl9pPr marL="2438522" indent="0">
+              <a:buNone/>
+              <a:defRPr sz="667"/>
             </a:lvl9pPr>
           </a:lstStyle>
           <a:p>
@@ -2355,7 +2355,7 @@
           <a:p>
             <a:fld id="{C4EF3122-51AB-46F6-A64E-83495DCDC288}" type="datetimeFigureOut">
               <a:rPr lang="en-US" smtClean="0"/>
-              <a:t>9/5/2025</a:t>
+              <a:t>9/28/2025</a:t>
             </a:fld>
             <a:endParaRPr lang="en-US"/>
           </a:p>
@@ -2406,7 +2406,7 @@
     </p:spTree>
     <p:extLst>
       <p:ext uri="{BB962C8B-B14F-4D97-AF65-F5344CB8AC3E}">
-        <p14:creationId xmlns:p14="http://schemas.microsoft.com/office/powerpoint/2010/main" val="3072189160"/>
+        <p14:creationId xmlns:p14="http://schemas.microsoft.com/office/powerpoint/2010/main" val="1125055430"/>
       </p:ext>
     </p:extLst>
   </p:cSld>
@@ -2450,8 +2450,8 @@
         </p:nvSpPr>
         <p:spPr>
           <a:xfrm>
-            <a:off x="559455" y="365127"/>
-            <a:ext cx="7018615" cy="1325563"/>
+            <a:off x="559455" y="243417"/>
+            <a:ext cx="7018615" cy="883709"/>
           </a:xfrm>
           <a:prstGeom prst="rect">
             <a:avLst/>
@@ -2483,8 +2483,8 @@
         </p:nvSpPr>
         <p:spPr>
           <a:xfrm>
-            <a:off x="559455" y="1825625"/>
-            <a:ext cx="7018615" cy="4351338"/>
+            <a:off x="559455" y="1217083"/>
+            <a:ext cx="7018615" cy="2900892"/>
           </a:xfrm>
           <a:prstGeom prst="rect">
             <a:avLst/>
@@ -2545,8 +2545,8 @@
         </p:nvSpPr>
         <p:spPr>
           <a:xfrm>
-            <a:off x="559455" y="6356352"/>
-            <a:ext cx="1830943" cy="365125"/>
+            <a:off x="559455" y="4237567"/>
+            <a:ext cx="1830943" cy="243417"/>
           </a:xfrm>
           <a:prstGeom prst="rect">
             <a:avLst/>
@@ -2556,7 +2556,7 @@
           <a:bodyPr vert="horz" lIns="91440" tIns="45720" rIns="91440" bIns="45720" rtlCol="0" anchor="ctr"/>
           <a:lstStyle>
             <a:lvl1pPr algn="l">
-              <a:defRPr sz="1068">
+              <a:defRPr sz="800">
                 <a:solidFill>
                   <a:schemeClr val="tx1">
                     <a:tint val="82000"/>
@@ -2568,7 +2568,7 @@
           <a:p>
             <a:fld id="{C4EF3122-51AB-46F6-A64E-83495DCDC288}" type="datetimeFigureOut">
               <a:rPr lang="en-US" smtClean="0"/>
-              <a:t>9/5/2025</a:t>
+              <a:t>9/28/2025</a:t>
             </a:fld>
             <a:endParaRPr lang="en-US"/>
           </a:p>
@@ -2586,8 +2586,8 @@
         </p:nvSpPr>
         <p:spPr>
           <a:xfrm>
-            <a:off x="2695555" y="6356352"/>
-            <a:ext cx="2746415" cy="365125"/>
+            <a:off x="2695555" y="4237567"/>
+            <a:ext cx="2746415" cy="243417"/>
           </a:xfrm>
           <a:prstGeom prst="rect">
             <a:avLst/>
@@ -2597,7 +2597,7 @@
           <a:bodyPr vert="horz" lIns="91440" tIns="45720" rIns="91440" bIns="45720" rtlCol="0" anchor="ctr"/>
           <a:lstStyle>
             <a:lvl1pPr algn="ctr">
-              <a:defRPr sz="1068">
+              <a:defRPr sz="800">
                 <a:solidFill>
                   <a:schemeClr val="tx1">
                     <a:tint val="82000"/>
@@ -2623,8 +2623,8 @@
         </p:nvSpPr>
         <p:spPr>
           <a:xfrm>
-            <a:off x="5747127" y="6356352"/>
-            <a:ext cx="1830943" cy="365125"/>
+            <a:off x="5747127" y="4237567"/>
+            <a:ext cx="1830943" cy="243417"/>
           </a:xfrm>
           <a:prstGeom prst="rect">
             <a:avLst/>
@@ -2634,7 +2634,7 @@
           <a:bodyPr vert="horz" lIns="91440" tIns="45720" rIns="91440" bIns="45720" rtlCol="0" anchor="ctr"/>
           <a:lstStyle>
             <a:lvl1pPr algn="r">
-              <a:defRPr sz="1068">
+              <a:defRPr sz="800">
                 <a:solidFill>
                   <a:schemeClr val="tx1">
                     <a:tint val="82000"/>
@@ -2655,27 +2655,27 @@
     </p:spTree>
     <p:extLst>
       <p:ext uri="{BB962C8B-B14F-4D97-AF65-F5344CB8AC3E}">
-        <p14:creationId xmlns:p14="http://schemas.microsoft.com/office/powerpoint/2010/main" val="3785740892"/>
+        <p14:creationId xmlns:p14="http://schemas.microsoft.com/office/powerpoint/2010/main" val="3824019382"/>
       </p:ext>
     </p:extLst>
   </p:cSld>
   <p:clrMap bg1="lt1" tx1="dk1" bg2="lt2" tx2="dk2" accent1="accent1" accent2="accent2" accent3="accent3" accent4="accent4" accent5="accent5" accent6="accent6" hlink="hlink" folHlink="folHlink"/>
   <p:sldLayoutIdLst>
-    <p:sldLayoutId id="2147483685" r:id="rId1"/>
-    <p:sldLayoutId id="2147483686" r:id="rId2"/>
-    <p:sldLayoutId id="2147483687" r:id="rId3"/>
-    <p:sldLayoutId id="2147483688" r:id="rId4"/>
-    <p:sldLayoutId id="2147483689" r:id="rId5"/>
-    <p:sldLayoutId id="2147483690" r:id="rId6"/>
-    <p:sldLayoutId id="2147483691" r:id="rId7"/>
-    <p:sldLayoutId id="2147483692" r:id="rId8"/>
-    <p:sldLayoutId id="2147483693" r:id="rId9"/>
-    <p:sldLayoutId id="2147483694" r:id="rId10"/>
-    <p:sldLayoutId id="2147483695" r:id="rId11"/>
+    <p:sldLayoutId id="2147483697" r:id="rId1"/>
+    <p:sldLayoutId id="2147483698" r:id="rId2"/>
+    <p:sldLayoutId id="2147483699" r:id="rId3"/>
+    <p:sldLayoutId id="2147483700" r:id="rId4"/>
+    <p:sldLayoutId id="2147483701" r:id="rId5"/>
+    <p:sldLayoutId id="2147483702" r:id="rId6"/>
+    <p:sldLayoutId id="2147483703" r:id="rId7"/>
+    <p:sldLayoutId id="2147483704" r:id="rId8"/>
+    <p:sldLayoutId id="2147483705" r:id="rId9"/>
+    <p:sldLayoutId id="2147483706" r:id="rId10"/>
+    <p:sldLayoutId id="2147483707" r:id="rId11"/>
   </p:sldLayoutIdLst>
   <p:txStyles>
     <p:titleStyle>
-      <a:lvl1pPr algn="l" defTabSz="813725" rtl="0" eaLnBrk="1" latinLnBrk="0" hangingPunct="1">
+      <a:lvl1pPr algn="l" defTabSz="609630" rtl="0" eaLnBrk="1" latinLnBrk="0" hangingPunct="1">
         <a:lnSpc>
           <a:spcPct val="90000"/>
         </a:lnSpc>
@@ -2683,7 +2683,7 @@
           <a:spcPct val="0"/>
         </a:spcBef>
         <a:buNone/>
-        <a:defRPr sz="3916" kern="1200">
+        <a:defRPr sz="2933" kern="1200">
           <a:solidFill>
             <a:schemeClr val="tx1"/>
           </a:solidFill>
@@ -2694,16 +2694,16 @@
       </a:lvl1pPr>
     </p:titleStyle>
     <p:bodyStyle>
-      <a:lvl1pPr marL="203431" indent="-203431" algn="l" defTabSz="813725" rtl="0" eaLnBrk="1" latinLnBrk="0" hangingPunct="1">
+      <a:lvl1pPr marL="152408" indent="-152408" algn="l" defTabSz="609630" rtl="0" eaLnBrk="1" latinLnBrk="0" hangingPunct="1">
         <a:lnSpc>
           <a:spcPct val="90000"/>
         </a:lnSpc>
         <a:spcBef>
-          <a:spcPts val="890"/>
+          <a:spcPts val="667"/>
         </a:spcBef>
         <a:buFont typeface="Arial" panose="020B0604020202020204" pitchFamily="34" charset="0"/>
         <a:buChar char="•"/>
-        <a:defRPr sz="2492" kern="1200">
+        <a:defRPr sz="1867" kern="1200">
           <a:solidFill>
             <a:schemeClr val="tx1"/>
           </a:solidFill>
@@ -2712,16 +2712,16 @@
           <a:cs typeface="+mn-cs"/>
         </a:defRPr>
       </a:lvl1pPr>
-      <a:lvl2pPr marL="610293" indent="-203431" algn="l" defTabSz="813725" rtl="0" eaLnBrk="1" latinLnBrk="0" hangingPunct="1">
+      <a:lvl2pPr marL="457223" indent="-152408" algn="l" defTabSz="609630" rtl="0" eaLnBrk="1" latinLnBrk="0" hangingPunct="1">
         <a:lnSpc>
           <a:spcPct val="90000"/>
         </a:lnSpc>
         <a:spcBef>
-          <a:spcPts val="445"/>
+          <a:spcPts val="333"/>
         </a:spcBef>
         <a:buFont typeface="Arial" panose="020B0604020202020204" pitchFamily="34" charset="0"/>
         <a:buChar char="•"/>
-        <a:defRPr sz="2136" kern="1200">
+        <a:defRPr sz="1600" kern="1200">
           <a:solidFill>
             <a:schemeClr val="tx1"/>
           </a:solidFill>
@@ -2730,16 +2730,16 @@
           <a:cs typeface="+mn-cs"/>
         </a:defRPr>
       </a:lvl2pPr>
-      <a:lvl3pPr marL="1017156" indent="-203431" algn="l" defTabSz="813725" rtl="0" eaLnBrk="1" latinLnBrk="0" hangingPunct="1">
+      <a:lvl3pPr marL="762038" indent="-152408" algn="l" defTabSz="609630" rtl="0" eaLnBrk="1" latinLnBrk="0" hangingPunct="1">
         <a:lnSpc>
           <a:spcPct val="90000"/>
         </a:lnSpc>
         <a:spcBef>
-          <a:spcPts val="445"/>
+          <a:spcPts val="333"/>
         </a:spcBef>
         <a:buFont typeface="Arial" panose="020B0604020202020204" pitchFamily="34" charset="0"/>
         <a:buChar char="•"/>
-        <a:defRPr sz="1780" kern="1200">
+        <a:defRPr sz="1333" kern="1200">
           <a:solidFill>
             <a:schemeClr val="tx1"/>
           </a:solidFill>
@@ -2748,16 +2748,16 @@
           <a:cs typeface="+mn-cs"/>
         </a:defRPr>
       </a:lvl3pPr>
-      <a:lvl4pPr marL="1424018" indent="-203431" algn="l" defTabSz="813725" rtl="0" eaLnBrk="1" latinLnBrk="0" hangingPunct="1">
+      <a:lvl4pPr marL="1066853" indent="-152408" algn="l" defTabSz="609630" rtl="0" eaLnBrk="1" latinLnBrk="0" hangingPunct="1">
         <a:lnSpc>
           <a:spcPct val="90000"/>
         </a:lnSpc>
         <a:spcBef>
-          <a:spcPts val="445"/>
+          <a:spcPts val="333"/>
         </a:spcBef>
         <a:buFont typeface="Arial" panose="020B0604020202020204" pitchFamily="34" charset="0"/>
         <a:buChar char="•"/>
-        <a:defRPr sz="1602" kern="1200">
+        <a:defRPr sz="1200" kern="1200">
           <a:solidFill>
             <a:schemeClr val="tx1"/>
           </a:solidFill>
@@ -2766,16 +2766,16 @@
           <a:cs typeface="+mn-cs"/>
         </a:defRPr>
       </a:lvl4pPr>
-      <a:lvl5pPr marL="1830880" indent="-203431" algn="l" defTabSz="813725" rtl="0" eaLnBrk="1" latinLnBrk="0" hangingPunct="1">
+      <a:lvl5pPr marL="1371669" indent="-152408" algn="l" defTabSz="609630" rtl="0" eaLnBrk="1" latinLnBrk="0" hangingPunct="1">
         <a:lnSpc>
           <a:spcPct val="90000"/>
         </a:lnSpc>
         <a:spcBef>
-          <a:spcPts val="445"/>
+          <a:spcPts val="333"/>
         </a:spcBef>
         <a:buFont typeface="Arial" panose="020B0604020202020204" pitchFamily="34" charset="0"/>
         <a:buChar char="•"/>
-        <a:defRPr sz="1602" kern="1200">
+        <a:defRPr sz="1200" kern="1200">
           <a:solidFill>
             <a:schemeClr val="tx1"/>
           </a:solidFill>
@@ -2784,16 +2784,16 @@
           <a:cs typeface="+mn-cs"/>
         </a:defRPr>
       </a:lvl5pPr>
-      <a:lvl6pPr marL="2237743" indent="-203431" algn="l" defTabSz="813725" rtl="0" eaLnBrk="1" latinLnBrk="0" hangingPunct="1">
+      <a:lvl6pPr marL="1676484" indent="-152408" algn="l" defTabSz="609630" rtl="0" eaLnBrk="1" latinLnBrk="0" hangingPunct="1">
         <a:lnSpc>
           <a:spcPct val="90000"/>
         </a:lnSpc>
         <a:spcBef>
-          <a:spcPts val="445"/>
+          <a:spcPts val="333"/>
         </a:spcBef>
         <a:buFont typeface="Arial" panose="020B0604020202020204" pitchFamily="34" charset="0"/>
         <a:buChar char="•"/>
-        <a:defRPr sz="1602" kern="1200">
+        <a:defRPr sz="1200" kern="1200">
           <a:solidFill>
             <a:schemeClr val="tx1"/>
           </a:solidFill>
@@ -2802,16 +2802,16 @@
           <a:cs typeface="+mn-cs"/>
         </a:defRPr>
       </a:lvl6pPr>
-      <a:lvl7pPr marL="2644605" indent="-203431" algn="l" defTabSz="813725" rtl="0" eaLnBrk="1" latinLnBrk="0" hangingPunct="1">
+      <a:lvl7pPr marL="1981299" indent="-152408" algn="l" defTabSz="609630" rtl="0" eaLnBrk="1" latinLnBrk="0" hangingPunct="1">
         <a:lnSpc>
           <a:spcPct val="90000"/>
         </a:lnSpc>
         <a:spcBef>
-          <a:spcPts val="445"/>
+          <a:spcPts val="333"/>
         </a:spcBef>
         <a:buFont typeface="Arial" panose="020B0604020202020204" pitchFamily="34" charset="0"/>
         <a:buChar char="•"/>
-        <a:defRPr sz="1602" kern="1200">
+        <a:defRPr sz="1200" kern="1200">
           <a:solidFill>
             <a:schemeClr val="tx1"/>
           </a:solidFill>
@@ -2820,16 +2820,16 @@
           <a:cs typeface="+mn-cs"/>
         </a:defRPr>
       </a:lvl7pPr>
-      <a:lvl8pPr marL="3051467" indent="-203431" algn="l" defTabSz="813725" rtl="0" eaLnBrk="1" latinLnBrk="0" hangingPunct="1">
+      <a:lvl8pPr marL="2286114" indent="-152408" algn="l" defTabSz="609630" rtl="0" eaLnBrk="1" latinLnBrk="0" hangingPunct="1">
         <a:lnSpc>
           <a:spcPct val="90000"/>
         </a:lnSpc>
         <a:spcBef>
-          <a:spcPts val="445"/>
+          <a:spcPts val="333"/>
         </a:spcBef>
         <a:buFont typeface="Arial" panose="020B0604020202020204" pitchFamily="34" charset="0"/>
         <a:buChar char="•"/>
-        <a:defRPr sz="1602" kern="1200">
+        <a:defRPr sz="1200" kern="1200">
           <a:solidFill>
             <a:schemeClr val="tx1"/>
           </a:solidFill>
@@ -2838,16 +2838,16 @@
           <a:cs typeface="+mn-cs"/>
         </a:defRPr>
       </a:lvl8pPr>
-      <a:lvl9pPr marL="3458329" indent="-203431" algn="l" defTabSz="813725" rtl="0" eaLnBrk="1" latinLnBrk="0" hangingPunct="1">
+      <a:lvl9pPr marL="2590930" indent="-152408" algn="l" defTabSz="609630" rtl="0" eaLnBrk="1" latinLnBrk="0" hangingPunct="1">
         <a:lnSpc>
           <a:spcPct val="90000"/>
         </a:lnSpc>
         <a:spcBef>
-          <a:spcPts val="445"/>
+          <a:spcPts val="333"/>
         </a:spcBef>
         <a:buFont typeface="Arial" panose="020B0604020202020204" pitchFamily="34" charset="0"/>
         <a:buChar char="•"/>
-        <a:defRPr sz="1602" kern="1200">
+        <a:defRPr sz="1200" kern="1200">
           <a:solidFill>
             <a:schemeClr val="tx1"/>
           </a:solidFill>
@@ -2861,8 +2861,8 @@
       <a:defPPr>
         <a:defRPr lang="en-US"/>
       </a:defPPr>
-      <a:lvl1pPr marL="0" algn="l" defTabSz="813725" rtl="0" eaLnBrk="1" latinLnBrk="0" hangingPunct="1">
-        <a:defRPr sz="1602" kern="1200">
+      <a:lvl1pPr marL="0" algn="l" defTabSz="609630" rtl="0" eaLnBrk="1" latinLnBrk="0" hangingPunct="1">
+        <a:defRPr sz="1200" kern="1200">
           <a:solidFill>
             <a:schemeClr val="tx1"/>
           </a:solidFill>
@@ -2871,8 +2871,8 @@
           <a:cs typeface="+mn-cs"/>
         </a:defRPr>
       </a:lvl1pPr>
-      <a:lvl2pPr marL="406862" algn="l" defTabSz="813725" rtl="0" eaLnBrk="1" latinLnBrk="0" hangingPunct="1">
-        <a:defRPr sz="1602" kern="1200">
+      <a:lvl2pPr marL="304815" algn="l" defTabSz="609630" rtl="0" eaLnBrk="1" latinLnBrk="0" hangingPunct="1">
+        <a:defRPr sz="1200" kern="1200">
           <a:solidFill>
             <a:schemeClr val="tx1"/>
           </a:solidFill>
@@ -2881,8 +2881,8 @@
           <a:cs typeface="+mn-cs"/>
         </a:defRPr>
       </a:lvl2pPr>
-      <a:lvl3pPr marL="813725" algn="l" defTabSz="813725" rtl="0" eaLnBrk="1" latinLnBrk="0" hangingPunct="1">
-        <a:defRPr sz="1602" kern="1200">
+      <a:lvl3pPr marL="609630" algn="l" defTabSz="609630" rtl="0" eaLnBrk="1" latinLnBrk="0" hangingPunct="1">
+        <a:defRPr sz="1200" kern="1200">
           <a:solidFill>
             <a:schemeClr val="tx1"/>
           </a:solidFill>
@@ -2891,8 +2891,8 @@
           <a:cs typeface="+mn-cs"/>
         </a:defRPr>
       </a:lvl3pPr>
-      <a:lvl4pPr marL="1220587" algn="l" defTabSz="813725" rtl="0" eaLnBrk="1" latinLnBrk="0" hangingPunct="1">
-        <a:defRPr sz="1602" kern="1200">
+      <a:lvl4pPr marL="914446" algn="l" defTabSz="609630" rtl="0" eaLnBrk="1" latinLnBrk="0" hangingPunct="1">
+        <a:defRPr sz="1200" kern="1200">
           <a:solidFill>
             <a:schemeClr val="tx1"/>
           </a:solidFill>
@@ -2901,8 +2901,8 @@
           <a:cs typeface="+mn-cs"/>
         </a:defRPr>
       </a:lvl4pPr>
-      <a:lvl5pPr marL="1627449" algn="l" defTabSz="813725" rtl="0" eaLnBrk="1" latinLnBrk="0" hangingPunct="1">
-        <a:defRPr sz="1602" kern="1200">
+      <a:lvl5pPr marL="1219261" algn="l" defTabSz="609630" rtl="0" eaLnBrk="1" latinLnBrk="0" hangingPunct="1">
+        <a:defRPr sz="1200" kern="1200">
           <a:solidFill>
             <a:schemeClr val="tx1"/>
           </a:solidFill>
@@ -2911,8 +2911,8 @@
           <a:cs typeface="+mn-cs"/>
         </a:defRPr>
       </a:lvl5pPr>
-      <a:lvl6pPr marL="2034311" algn="l" defTabSz="813725" rtl="0" eaLnBrk="1" latinLnBrk="0" hangingPunct="1">
-        <a:defRPr sz="1602" kern="1200">
+      <a:lvl6pPr marL="1524076" algn="l" defTabSz="609630" rtl="0" eaLnBrk="1" latinLnBrk="0" hangingPunct="1">
+        <a:defRPr sz="1200" kern="1200">
           <a:solidFill>
             <a:schemeClr val="tx1"/>
           </a:solidFill>
@@ -2921,8 +2921,8 @@
           <a:cs typeface="+mn-cs"/>
         </a:defRPr>
       </a:lvl6pPr>
-      <a:lvl7pPr marL="2441174" algn="l" defTabSz="813725" rtl="0" eaLnBrk="1" latinLnBrk="0" hangingPunct="1">
-        <a:defRPr sz="1602" kern="1200">
+      <a:lvl7pPr marL="1828891" algn="l" defTabSz="609630" rtl="0" eaLnBrk="1" latinLnBrk="0" hangingPunct="1">
+        <a:defRPr sz="1200" kern="1200">
           <a:solidFill>
             <a:schemeClr val="tx1"/>
           </a:solidFill>
@@ -2931,8 +2931,8 @@
           <a:cs typeface="+mn-cs"/>
         </a:defRPr>
       </a:lvl7pPr>
-      <a:lvl8pPr marL="2848036" algn="l" defTabSz="813725" rtl="0" eaLnBrk="1" latinLnBrk="0" hangingPunct="1">
-        <a:defRPr sz="1602" kern="1200">
+      <a:lvl8pPr marL="2133707" algn="l" defTabSz="609630" rtl="0" eaLnBrk="1" latinLnBrk="0" hangingPunct="1">
+        <a:defRPr sz="1200" kern="1200">
           <a:solidFill>
             <a:schemeClr val="tx1"/>
           </a:solidFill>
@@ -2941,8 +2941,8 @@
           <a:cs typeface="+mn-cs"/>
         </a:defRPr>
       </a:lvl8pPr>
-      <a:lvl9pPr marL="3254898" algn="l" defTabSz="813725" rtl="0" eaLnBrk="1" latinLnBrk="0" hangingPunct="1">
-        <a:defRPr sz="1602" kern="1200">
+      <a:lvl9pPr marL="2438522" algn="l" defTabSz="609630" rtl="0" eaLnBrk="1" latinLnBrk="0" hangingPunct="1">
+        <a:defRPr sz="1200" kern="1200">
           <a:solidFill>
             <a:schemeClr val="tx1"/>
           </a:solidFill>
@@ -2975,10 +2975,10 @@
       </p:grpSpPr>
       <p:pic>
         <p:nvPicPr>
-          <p:cNvPr id="3" name="Graphic 2">
+          <p:cNvPr id="25" name="Graphic 24">
             <a:extLst>
               <a:ext uri="{FF2B5EF4-FFF2-40B4-BE49-F238E27FC236}">
-                <a16:creationId xmlns:a16="http://schemas.microsoft.com/office/drawing/2014/main" id="{3C9A58FD-2A9D-5EA7-94EC-21316779A9CF}"/>
+                <a16:creationId xmlns:a16="http://schemas.microsoft.com/office/drawing/2014/main" id="{7F43311D-0E15-02FD-7E84-BA17B906CFF5}"/>
               </a:ext>
             </a:extLst>
           </p:cNvPr>
@@ -2995,14 +2995,13 @@
               </a:ext>
             </a:extLst>
           </a:blip>
-          <a:stretch>
-            <a:fillRect/>
-          </a:stretch>
+          <a:srcRect/>
+          <a:stretch/>
         </p:blipFill>
         <p:spPr>
           <a:xfrm>
-            <a:off x="137818" y="-3660"/>
-            <a:ext cx="8068235" cy="6858000"/>
+            <a:off x="-1" y="313571"/>
+            <a:ext cx="8137524" cy="4192057"/>
           </a:xfrm>
           <a:prstGeom prst="rect">
             <a:avLst/>
@@ -3023,8 +3022,8 @@
         </p:nvSpPr>
         <p:spPr>
           <a:xfrm flipH="1">
-            <a:off x="775018" y="163449"/>
-            <a:ext cx="265176" cy="369332"/>
+            <a:off x="348298" y="202788"/>
+            <a:ext cx="265176" cy="307777"/>
           </a:xfrm>
           <a:prstGeom prst="rect">
             <a:avLst/>
@@ -3038,7 +3037,7 @@
           <a:lstStyle/>
           <a:p>
             <a:r>
-              <a:rPr lang="en-US" b="1" dirty="0"/>
+              <a:rPr lang="en-US" sz="1400" b="1" dirty="0"/>
               <a:t>A</a:t>
             </a:r>
           </a:p>
@@ -3046,10 +3045,10 @@
       </p:sp>
       <p:sp>
         <p:nvSpPr>
-          <p:cNvPr id="5" name="TextBox 4">
+          <p:cNvPr id="15" name="TextBox 14">
             <a:extLst>
               <a:ext uri="{FF2B5EF4-FFF2-40B4-BE49-F238E27FC236}">
-                <a16:creationId xmlns:a16="http://schemas.microsoft.com/office/drawing/2014/main" id="{ABD3CEBB-92FF-3951-5D68-3C9FDFE78231}"/>
+                <a16:creationId xmlns:a16="http://schemas.microsoft.com/office/drawing/2014/main" id="{ED16DC6A-D15E-B3EC-1D25-6676E99EFE97}"/>
               </a:ext>
             </a:extLst>
           </p:cNvPr>
@@ -3058,8 +3057,8 @@
         </p:nvSpPr>
         <p:spPr>
           <a:xfrm flipH="1">
-            <a:off x="3917506" y="163449"/>
-            <a:ext cx="265176" cy="369332"/>
+            <a:off x="2183276" y="196607"/>
+            <a:ext cx="265176" cy="307777"/>
           </a:xfrm>
           <a:prstGeom prst="rect">
             <a:avLst/>
@@ -3073,7 +3072,7 @@
           <a:lstStyle/>
           <a:p>
             <a:r>
-              <a:rPr lang="en-US" b="1" dirty="0"/>
+              <a:rPr lang="en-US" sz="1400" b="1" dirty="0"/>
               <a:t>B</a:t>
             </a:r>
           </a:p>
@@ -3081,10 +3080,10 @@
       </p:sp>
       <p:sp>
         <p:nvSpPr>
-          <p:cNvPr id="6" name="TextBox 5">
+          <p:cNvPr id="16" name="TextBox 15">
             <a:extLst>
               <a:ext uri="{FF2B5EF4-FFF2-40B4-BE49-F238E27FC236}">
-                <a16:creationId xmlns:a16="http://schemas.microsoft.com/office/drawing/2014/main" id="{D524A09A-B3EF-49E5-2777-56B20DDF3248}"/>
+                <a16:creationId xmlns:a16="http://schemas.microsoft.com/office/drawing/2014/main" id="{E2DBD4A2-882E-FEEC-9DA6-1513EA92F5DE}"/>
               </a:ext>
             </a:extLst>
           </p:cNvPr>
@@ -3093,8 +3092,8 @@
         </p:nvSpPr>
         <p:spPr>
           <a:xfrm flipH="1">
-            <a:off x="765874" y="3264527"/>
-            <a:ext cx="265176" cy="369332"/>
+            <a:off x="3973925" y="196929"/>
+            <a:ext cx="265176" cy="307777"/>
           </a:xfrm>
           <a:prstGeom prst="rect">
             <a:avLst/>
@@ -3108,7 +3107,7 @@
           <a:lstStyle/>
           <a:p>
             <a:r>
-              <a:rPr lang="en-US" b="1" dirty="0"/>
+              <a:rPr lang="en-US" sz="1400" b="1" dirty="0"/>
               <a:t>C</a:t>
             </a:r>
           </a:p>
@@ -3116,10 +3115,10 @@
       </p:sp>
       <p:sp>
         <p:nvSpPr>
-          <p:cNvPr id="7" name="TextBox 6">
+          <p:cNvPr id="17" name="TextBox 16">
             <a:extLst>
               <a:ext uri="{FF2B5EF4-FFF2-40B4-BE49-F238E27FC236}">
-                <a16:creationId xmlns:a16="http://schemas.microsoft.com/office/drawing/2014/main" id="{CC4B30BD-9378-50AF-B00F-32A0D5E0EA3C}"/>
+                <a16:creationId xmlns:a16="http://schemas.microsoft.com/office/drawing/2014/main" id="{F7DCDFB3-970B-62E8-FE48-0E2BD41463C7}"/>
               </a:ext>
             </a:extLst>
           </p:cNvPr>
@@ -3128,8 +3127,8 @@
         </p:nvSpPr>
         <p:spPr>
           <a:xfrm flipH="1">
-            <a:off x="3917507" y="3264527"/>
-            <a:ext cx="265176" cy="369332"/>
+            <a:off x="5810059" y="199811"/>
+            <a:ext cx="265176" cy="307777"/>
           </a:xfrm>
           <a:prstGeom prst="rect">
             <a:avLst/>
@@ -3143,12 +3142,864 @@
           <a:lstStyle/>
           <a:p>
             <a:r>
-              <a:rPr lang="en-US" b="1" dirty="0"/>
+              <a:rPr lang="en-US" sz="1400" b="1" dirty="0"/>
               <a:t>D</a:t>
             </a:r>
           </a:p>
         </p:txBody>
       </p:sp>
+      <p:sp>
+        <p:nvSpPr>
+          <p:cNvPr id="18" name="TextBox 17">
+            <a:extLst>
+              <a:ext uri="{FF2B5EF4-FFF2-40B4-BE49-F238E27FC236}">
+                <a16:creationId xmlns:a16="http://schemas.microsoft.com/office/drawing/2014/main" id="{D70F9AC7-8B93-BF7C-9666-9FCFC41C625E}"/>
+              </a:ext>
+            </a:extLst>
+          </p:cNvPr>
+          <p:cNvSpPr txBox="1"/>
+          <p:nvPr/>
+        </p:nvSpPr>
+        <p:spPr>
+          <a:xfrm flipH="1">
+            <a:off x="538100" y="2418325"/>
+            <a:ext cx="265176" cy="307777"/>
+          </a:xfrm>
+          <a:prstGeom prst="rect">
+            <a:avLst/>
+          </a:prstGeom>
+          <a:noFill/>
+        </p:spPr>
+        <p:txBody>
+          <a:bodyPr wrap="square" rtlCol="0">
+            <a:spAutoFit/>
+          </a:bodyPr>
+          <a:lstStyle/>
+          <a:p>
+            <a:r>
+              <a:rPr lang="en-US" sz="1400" b="1" dirty="0"/>
+              <a:t>E</a:t>
+            </a:r>
+          </a:p>
+        </p:txBody>
+      </p:sp>
+      <p:sp>
+        <p:nvSpPr>
+          <p:cNvPr id="19" name="TextBox 18">
+            <a:extLst>
+              <a:ext uri="{FF2B5EF4-FFF2-40B4-BE49-F238E27FC236}">
+                <a16:creationId xmlns:a16="http://schemas.microsoft.com/office/drawing/2014/main" id="{5EEC4D8B-38BF-614A-CF69-D23E0843BE2A}"/>
+              </a:ext>
+            </a:extLst>
+          </p:cNvPr>
+          <p:cNvSpPr txBox="1"/>
+          <p:nvPr/>
+        </p:nvSpPr>
+        <p:spPr>
+          <a:xfrm flipH="1">
+            <a:off x="2320482" y="2418325"/>
+            <a:ext cx="265176" cy="307777"/>
+          </a:xfrm>
+          <a:prstGeom prst="rect">
+            <a:avLst/>
+          </a:prstGeom>
+          <a:noFill/>
+        </p:spPr>
+        <p:txBody>
+          <a:bodyPr wrap="square" rtlCol="0">
+            <a:spAutoFit/>
+          </a:bodyPr>
+          <a:lstStyle/>
+          <a:p>
+            <a:r>
+              <a:rPr lang="en-US" sz="1400" b="1" dirty="0"/>
+              <a:t>F</a:t>
+            </a:r>
+          </a:p>
+        </p:txBody>
+      </p:sp>
+      <p:sp>
+        <p:nvSpPr>
+          <p:cNvPr id="20" name="TextBox 19">
+            <a:extLst>
+              <a:ext uri="{FF2B5EF4-FFF2-40B4-BE49-F238E27FC236}">
+                <a16:creationId xmlns:a16="http://schemas.microsoft.com/office/drawing/2014/main" id="{A606DFEB-A4EF-C442-D63F-016CCE27B484}"/>
+              </a:ext>
+            </a:extLst>
+          </p:cNvPr>
+          <p:cNvSpPr txBox="1"/>
+          <p:nvPr/>
+        </p:nvSpPr>
+        <p:spPr>
+          <a:xfrm flipH="1">
+            <a:off x="4050094" y="2418325"/>
+            <a:ext cx="265176" cy="307777"/>
+          </a:xfrm>
+          <a:prstGeom prst="rect">
+            <a:avLst/>
+          </a:prstGeom>
+          <a:noFill/>
+        </p:spPr>
+        <p:txBody>
+          <a:bodyPr wrap="square" rtlCol="0">
+            <a:spAutoFit/>
+          </a:bodyPr>
+          <a:lstStyle/>
+          <a:p>
+            <a:r>
+              <a:rPr lang="en-US" sz="1400" b="1" dirty="0"/>
+              <a:t>G</a:t>
+            </a:r>
+          </a:p>
+        </p:txBody>
+      </p:sp>
+      <p:sp>
+        <p:nvSpPr>
+          <p:cNvPr id="21" name="TextBox 20">
+            <a:extLst>
+              <a:ext uri="{FF2B5EF4-FFF2-40B4-BE49-F238E27FC236}">
+                <a16:creationId xmlns:a16="http://schemas.microsoft.com/office/drawing/2014/main" id="{2009EC47-DB1A-71BF-E9DF-8B444126C163}"/>
+              </a:ext>
+            </a:extLst>
+          </p:cNvPr>
+          <p:cNvSpPr txBox="1"/>
+          <p:nvPr/>
+        </p:nvSpPr>
+        <p:spPr>
+          <a:xfrm flipH="1">
+            <a:off x="5813393" y="2418325"/>
+            <a:ext cx="265176" cy="307777"/>
+          </a:xfrm>
+          <a:prstGeom prst="rect">
+            <a:avLst/>
+          </a:prstGeom>
+          <a:noFill/>
+        </p:spPr>
+        <p:txBody>
+          <a:bodyPr wrap="square" rtlCol="0">
+            <a:spAutoFit/>
+          </a:bodyPr>
+          <a:lstStyle/>
+          <a:p>
+            <a:r>
+              <a:rPr lang="en-US" sz="1400" b="1" dirty="0"/>
+              <a:t>H</a:t>
+            </a:r>
+          </a:p>
+        </p:txBody>
+      </p:sp>
+      <p:sp>
+        <p:nvSpPr>
+          <p:cNvPr id="26" name="Rectangle 25">
+            <a:extLst>
+              <a:ext uri="{FF2B5EF4-FFF2-40B4-BE49-F238E27FC236}">
+                <a16:creationId xmlns:a16="http://schemas.microsoft.com/office/drawing/2014/main" id="{CB9C9C7B-D8AE-7C0C-9EB3-3492596D2917}"/>
+              </a:ext>
+            </a:extLst>
+          </p:cNvPr>
+          <p:cNvSpPr/>
+          <p:nvPr/>
+        </p:nvSpPr>
+        <p:spPr>
+          <a:xfrm>
+            <a:off x="557340" y="38756"/>
+            <a:ext cx="1449800" cy="182011"/>
+          </a:xfrm>
+          <a:prstGeom prst="rect">
+            <a:avLst/>
+          </a:prstGeom>
+          <a:solidFill>
+            <a:schemeClr val="bg2">
+              <a:lumMod val="90000"/>
+            </a:schemeClr>
+          </a:solidFill>
+          <a:ln>
+            <a:solidFill>
+              <a:schemeClr val="tx1"/>
+            </a:solidFill>
+          </a:ln>
+        </p:spPr>
+        <p:style>
+          <a:lnRef idx="2">
+            <a:schemeClr val="accent1">
+              <a:shade val="15000"/>
+            </a:schemeClr>
+          </a:lnRef>
+          <a:fillRef idx="1">
+            <a:schemeClr val="accent1"/>
+          </a:fillRef>
+          <a:effectRef idx="0">
+            <a:schemeClr val="accent1"/>
+          </a:effectRef>
+          <a:fontRef idx="minor">
+            <a:schemeClr val="lt1"/>
+          </a:fontRef>
+        </p:style>
+        <p:txBody>
+          <a:bodyPr rtlCol="0" anchor="ctr"/>
+          <a:lstStyle/>
+          <a:p>
+            <a:pPr algn="ctr"/>
+            <a:endParaRPr lang="en-US"/>
+          </a:p>
+        </p:txBody>
+      </p:sp>
+      <mc:AlternateContent xmlns:mc="http://schemas.openxmlformats.org/markup-compatibility/2006" xmlns:a14="http://schemas.microsoft.com/office/drawing/2010/main">
+        <mc:Choice Requires="a14">
+          <p:sp>
+            <p:nvSpPr>
+              <p:cNvPr id="27" name="TextBox 26">
+                <a:extLst>
+                  <a:ext uri="{FF2B5EF4-FFF2-40B4-BE49-F238E27FC236}">
+                    <a16:creationId xmlns:a16="http://schemas.microsoft.com/office/drawing/2014/main" id="{152396E1-BF7E-95E0-B821-B8953518D17E}"/>
+                  </a:ext>
+                </a:extLst>
+              </p:cNvPr>
+              <p:cNvSpPr txBox="1"/>
+              <p:nvPr/>
+            </p:nvSpPr>
+            <p:spPr>
+              <a:xfrm>
+                <a:off x="557340" y="23957"/>
+                <a:ext cx="1474956" cy="215444"/>
+              </a:xfrm>
+              <a:prstGeom prst="rect">
+                <a:avLst/>
+              </a:prstGeom>
+              <a:noFill/>
+            </p:spPr>
+            <p:txBody>
+              <a:bodyPr wrap="none" rtlCol="0">
+                <a:spAutoFit/>
+              </a:bodyPr>
+              <a:lstStyle/>
+              <a:p>
+                <a:r>
+                  <a:rPr lang="en-US" sz="800" dirty="0">
+                    <a:latin typeface="Arial" panose="020B0604020202020204" pitchFamily="34" charset="0"/>
+                    <a:cs typeface="Arial" panose="020B0604020202020204" pitchFamily="34" charset="0"/>
+                  </a:rPr>
+                  <a:t>Low autocorrelation; </a:t>
+                </a:r>
+                <a14:m>
+                  <m:oMath xmlns:m="http://schemas.openxmlformats.org/officeDocument/2006/math">
+                    <m:sSub>
+                      <m:sSubPr>
+                        <m:ctrlPr>
+                          <a:rPr lang="en-US" sz="800" b="0" i="1" smtClean="0">
+                            <a:latin typeface="Cambria Math" panose="02040503050406030204" pitchFamily="18" charset="0"/>
+                          </a:rPr>
+                        </m:ctrlPr>
+                      </m:sSubPr>
+                      <m:e>
+                        <m:r>
+                          <a:rPr lang="en-US" sz="800" b="0" i="1" smtClean="0">
+                            <a:latin typeface="Cambria Math" panose="02040503050406030204" pitchFamily="18" charset="0"/>
+                          </a:rPr>
+                          <m:t>𝜎</m:t>
+                        </m:r>
+                      </m:e>
+                      <m:sub>
+                        <m:r>
+                          <a:rPr lang="en-US" sz="800" b="0" i="1" smtClean="0">
+                            <a:latin typeface="Cambria Math" panose="02040503050406030204" pitchFamily="18" charset="0"/>
+                          </a:rPr>
+                          <m:t>𝐷</m:t>
+                        </m:r>
+                      </m:sub>
+                    </m:sSub>
+                    <m:r>
+                      <a:rPr lang="en-US" sz="800" b="0" i="1" smtClean="0">
+                        <a:latin typeface="Cambria Math" panose="02040503050406030204" pitchFamily="18" charset="0"/>
+                      </a:rPr>
+                      <m:t>=∞</m:t>
+                    </m:r>
+                  </m:oMath>
+                </a14:m>
+                <a:endParaRPr lang="en-US" sz="800" dirty="0"/>
+              </a:p>
+            </p:txBody>
+          </p:sp>
+        </mc:Choice>
+        <mc:Fallback xmlns="">
+          <p:sp>
+            <p:nvSpPr>
+              <p:cNvPr id="27" name="TextBox 26">
+                <a:extLst>
+                  <a:ext uri="{FF2B5EF4-FFF2-40B4-BE49-F238E27FC236}">
+                    <a16:creationId xmlns:a16="http://schemas.microsoft.com/office/drawing/2014/main" id="{152396E1-BF7E-95E0-B821-B8953518D17E}"/>
+                  </a:ext>
+                </a:extLst>
+              </p:cNvPr>
+              <p:cNvSpPr txBox="1">
+                <a:spLocks noRot="1" noChangeAspect="1" noMove="1" noResize="1" noEditPoints="1" noAdjustHandles="1" noChangeArrowheads="1" noChangeShapeType="1" noTextEdit="1"/>
+              </p:cNvSpPr>
+              <p:nvPr/>
+            </p:nvSpPr>
+            <p:spPr>
+              <a:xfrm>
+                <a:off x="557340" y="23957"/>
+                <a:ext cx="1474956" cy="215444"/>
+              </a:xfrm>
+              <a:prstGeom prst="rect">
+                <a:avLst/>
+              </a:prstGeom>
+              <a:blipFill>
+                <a:blip r:embed="rId4"/>
+                <a:stretch>
+                  <a:fillRect b="-8571"/>
+                </a:stretch>
+              </a:blipFill>
+            </p:spPr>
+            <p:txBody>
+              <a:bodyPr/>
+              <a:lstStyle/>
+              <a:p>
+                <a:r>
+                  <a:rPr lang="en-US">
+                    <a:noFill/>
+                  </a:rPr>
+                  <a:t> </a:t>
+                </a:r>
+              </a:p>
+            </p:txBody>
+          </p:sp>
+        </mc:Fallback>
+      </mc:AlternateContent>
+      <p:sp>
+        <p:nvSpPr>
+          <p:cNvPr id="28" name="Rectangle 27">
+            <a:extLst>
+              <a:ext uri="{FF2B5EF4-FFF2-40B4-BE49-F238E27FC236}">
+                <a16:creationId xmlns:a16="http://schemas.microsoft.com/office/drawing/2014/main" id="{637390A7-EBA0-4D08-7353-766B341E122C}"/>
+              </a:ext>
+            </a:extLst>
+          </p:cNvPr>
+          <p:cNvSpPr/>
+          <p:nvPr/>
+        </p:nvSpPr>
+        <p:spPr>
+          <a:xfrm>
+            <a:off x="2380847" y="38756"/>
+            <a:ext cx="1449800" cy="182011"/>
+          </a:xfrm>
+          <a:prstGeom prst="rect">
+            <a:avLst/>
+          </a:prstGeom>
+          <a:solidFill>
+            <a:schemeClr val="bg2">
+              <a:lumMod val="90000"/>
+            </a:schemeClr>
+          </a:solidFill>
+          <a:ln>
+            <a:solidFill>
+              <a:schemeClr val="tx1"/>
+            </a:solidFill>
+          </a:ln>
+        </p:spPr>
+        <p:style>
+          <a:lnRef idx="2">
+            <a:schemeClr val="accent1">
+              <a:shade val="15000"/>
+            </a:schemeClr>
+          </a:lnRef>
+          <a:fillRef idx="1">
+            <a:schemeClr val="accent1"/>
+          </a:fillRef>
+          <a:effectRef idx="0">
+            <a:schemeClr val="accent1"/>
+          </a:effectRef>
+          <a:fontRef idx="minor">
+            <a:schemeClr val="lt1"/>
+          </a:fontRef>
+        </p:style>
+        <p:txBody>
+          <a:bodyPr rtlCol="0" anchor="ctr"/>
+          <a:lstStyle/>
+          <a:p>
+            <a:pPr algn="ctr"/>
+            <a:endParaRPr lang="en-US"/>
+          </a:p>
+        </p:txBody>
+      </p:sp>
+      <mc:AlternateContent xmlns:mc="http://schemas.openxmlformats.org/markup-compatibility/2006" xmlns:a14="http://schemas.microsoft.com/office/drawing/2010/main">
+        <mc:Choice Requires="a14">
+          <p:sp>
+            <p:nvSpPr>
+              <p:cNvPr id="29" name="TextBox 28">
+                <a:extLst>
+                  <a:ext uri="{FF2B5EF4-FFF2-40B4-BE49-F238E27FC236}">
+                    <a16:creationId xmlns:a16="http://schemas.microsoft.com/office/drawing/2014/main" id="{14A2107E-7353-C87B-461F-F526B0FC6B62}"/>
+                  </a:ext>
+                </a:extLst>
+              </p:cNvPr>
+              <p:cNvSpPr txBox="1"/>
+              <p:nvPr/>
+            </p:nvSpPr>
+            <p:spPr>
+              <a:xfrm>
+                <a:off x="2380847" y="23957"/>
+                <a:ext cx="1497398" cy="215444"/>
+              </a:xfrm>
+              <a:prstGeom prst="rect">
+                <a:avLst/>
+              </a:prstGeom>
+              <a:noFill/>
+            </p:spPr>
+            <p:txBody>
+              <a:bodyPr wrap="none" rtlCol="0">
+                <a:spAutoFit/>
+              </a:bodyPr>
+              <a:lstStyle/>
+              <a:p>
+                <a:r>
+                  <a:rPr lang="en-US" sz="800" dirty="0">
+                    <a:latin typeface="Arial" panose="020B0604020202020204" pitchFamily="34" charset="0"/>
+                    <a:cs typeface="Arial" panose="020B0604020202020204" pitchFamily="34" charset="0"/>
+                  </a:rPr>
+                  <a:t>High autocorrelation; </a:t>
+                </a:r>
+                <a14:m>
+                  <m:oMath xmlns:m="http://schemas.openxmlformats.org/officeDocument/2006/math">
+                    <m:sSub>
+                      <m:sSubPr>
+                        <m:ctrlPr>
+                          <a:rPr lang="en-US" sz="800" b="0" i="1" smtClean="0">
+                            <a:latin typeface="Cambria Math" panose="02040503050406030204" pitchFamily="18" charset="0"/>
+                          </a:rPr>
+                        </m:ctrlPr>
+                      </m:sSubPr>
+                      <m:e>
+                        <m:r>
+                          <a:rPr lang="en-US" sz="800" b="0" i="1" smtClean="0">
+                            <a:latin typeface="Cambria Math" panose="02040503050406030204" pitchFamily="18" charset="0"/>
+                          </a:rPr>
+                          <m:t>𝜎</m:t>
+                        </m:r>
+                      </m:e>
+                      <m:sub>
+                        <m:r>
+                          <a:rPr lang="en-US" sz="800" b="0" i="1" smtClean="0">
+                            <a:latin typeface="Cambria Math" panose="02040503050406030204" pitchFamily="18" charset="0"/>
+                          </a:rPr>
+                          <m:t>𝐷</m:t>
+                        </m:r>
+                      </m:sub>
+                    </m:sSub>
+                    <m:r>
+                      <a:rPr lang="en-US" sz="800" b="0" i="1" smtClean="0">
+                        <a:latin typeface="Cambria Math" panose="02040503050406030204" pitchFamily="18" charset="0"/>
+                      </a:rPr>
+                      <m:t>=∞</m:t>
+                    </m:r>
+                  </m:oMath>
+                </a14:m>
+                <a:endParaRPr lang="en-US" sz="800" dirty="0"/>
+              </a:p>
+            </p:txBody>
+          </p:sp>
+        </mc:Choice>
+        <mc:Fallback xmlns="">
+          <p:sp>
+            <p:nvSpPr>
+              <p:cNvPr id="29" name="TextBox 28">
+                <a:extLst>
+                  <a:ext uri="{FF2B5EF4-FFF2-40B4-BE49-F238E27FC236}">
+                    <a16:creationId xmlns:a16="http://schemas.microsoft.com/office/drawing/2014/main" id="{14A2107E-7353-C87B-461F-F526B0FC6B62}"/>
+                  </a:ext>
+                </a:extLst>
+              </p:cNvPr>
+              <p:cNvSpPr txBox="1">
+                <a:spLocks noRot="1" noChangeAspect="1" noMove="1" noResize="1" noEditPoints="1" noAdjustHandles="1" noChangeArrowheads="1" noChangeShapeType="1" noTextEdit="1"/>
+              </p:cNvSpPr>
+              <p:nvPr/>
+            </p:nvSpPr>
+            <p:spPr>
+              <a:xfrm>
+                <a:off x="2380847" y="23957"/>
+                <a:ext cx="1497398" cy="215444"/>
+              </a:xfrm>
+              <a:prstGeom prst="rect">
+                <a:avLst/>
+              </a:prstGeom>
+              <a:blipFill>
+                <a:blip r:embed="rId5"/>
+                <a:stretch>
+                  <a:fillRect b="-8571"/>
+                </a:stretch>
+              </a:blipFill>
+            </p:spPr>
+            <p:txBody>
+              <a:bodyPr/>
+              <a:lstStyle/>
+              <a:p>
+                <a:r>
+                  <a:rPr lang="en-US">
+                    <a:noFill/>
+                  </a:rPr>
+                  <a:t> </a:t>
+                </a:r>
+              </a:p>
+            </p:txBody>
+          </p:sp>
+        </mc:Fallback>
+      </mc:AlternateContent>
+      <p:sp>
+        <p:nvSpPr>
+          <p:cNvPr id="30" name="Rectangle 29">
+            <a:extLst>
+              <a:ext uri="{FF2B5EF4-FFF2-40B4-BE49-F238E27FC236}">
+                <a16:creationId xmlns:a16="http://schemas.microsoft.com/office/drawing/2014/main" id="{FEB90949-5751-9F1E-31D0-635F12420EA1}"/>
+              </a:ext>
+            </a:extLst>
+          </p:cNvPr>
+          <p:cNvSpPr/>
+          <p:nvPr/>
+        </p:nvSpPr>
+        <p:spPr>
+          <a:xfrm>
+            <a:off x="4188696" y="36657"/>
+            <a:ext cx="1449800" cy="182011"/>
+          </a:xfrm>
+          <a:prstGeom prst="rect">
+            <a:avLst/>
+          </a:prstGeom>
+          <a:solidFill>
+            <a:schemeClr val="bg2">
+              <a:lumMod val="90000"/>
+            </a:schemeClr>
+          </a:solidFill>
+          <a:ln>
+            <a:solidFill>
+              <a:schemeClr val="tx1"/>
+            </a:solidFill>
+          </a:ln>
+        </p:spPr>
+        <p:style>
+          <a:lnRef idx="2">
+            <a:schemeClr val="accent1">
+              <a:shade val="15000"/>
+            </a:schemeClr>
+          </a:lnRef>
+          <a:fillRef idx="1">
+            <a:schemeClr val="accent1"/>
+          </a:fillRef>
+          <a:effectRef idx="0">
+            <a:schemeClr val="accent1"/>
+          </a:effectRef>
+          <a:fontRef idx="minor">
+            <a:schemeClr val="lt1"/>
+          </a:fontRef>
+        </p:style>
+        <p:txBody>
+          <a:bodyPr rtlCol="0" anchor="ctr"/>
+          <a:lstStyle/>
+          <a:p>
+            <a:pPr algn="ctr"/>
+            <a:endParaRPr lang="en-US"/>
+          </a:p>
+        </p:txBody>
+      </p:sp>
+      <mc:AlternateContent xmlns:mc="http://schemas.openxmlformats.org/markup-compatibility/2006" xmlns:a14="http://schemas.microsoft.com/office/drawing/2010/main">
+        <mc:Choice Requires="a14">
+          <p:sp>
+            <p:nvSpPr>
+              <p:cNvPr id="31" name="TextBox 30">
+                <a:extLst>
+                  <a:ext uri="{FF2B5EF4-FFF2-40B4-BE49-F238E27FC236}">
+                    <a16:creationId xmlns:a16="http://schemas.microsoft.com/office/drawing/2014/main" id="{2D2CB2CE-E7C9-0F25-0E02-7B967DE8C336}"/>
+                  </a:ext>
+                </a:extLst>
+              </p:cNvPr>
+              <p:cNvSpPr txBox="1"/>
+              <p:nvPr/>
+            </p:nvSpPr>
+            <p:spPr>
+              <a:xfrm>
+                <a:off x="4163296" y="21858"/>
+                <a:ext cx="1521442" cy="215444"/>
+              </a:xfrm>
+              <a:prstGeom prst="rect">
+                <a:avLst/>
+              </a:prstGeom>
+              <a:noFill/>
+            </p:spPr>
+            <p:txBody>
+              <a:bodyPr wrap="none" rtlCol="0">
+                <a:spAutoFit/>
+              </a:bodyPr>
+              <a:lstStyle/>
+              <a:p>
+                <a:r>
+                  <a:rPr lang="en-US" sz="800" dirty="0">
+                    <a:latin typeface="Arial" panose="020B0604020202020204" pitchFamily="34" charset="0"/>
+                    <a:cs typeface="Arial" panose="020B0604020202020204" pitchFamily="34" charset="0"/>
+                  </a:rPr>
+                  <a:t>Low autocorrelation; </a:t>
+                </a:r>
+                <a14:m>
+                  <m:oMath xmlns:m="http://schemas.openxmlformats.org/officeDocument/2006/math">
+                    <m:sSub>
+                      <m:sSubPr>
+                        <m:ctrlPr>
+                          <a:rPr lang="en-US" sz="800" b="0" i="1" smtClean="0">
+                            <a:latin typeface="Cambria Math" panose="02040503050406030204" pitchFamily="18" charset="0"/>
+                          </a:rPr>
+                        </m:ctrlPr>
+                      </m:sSubPr>
+                      <m:e>
+                        <m:r>
+                          <a:rPr lang="en-US" sz="800" b="0" i="1" smtClean="0">
+                            <a:latin typeface="Cambria Math" panose="02040503050406030204" pitchFamily="18" charset="0"/>
+                          </a:rPr>
+                          <m:t>𝜎</m:t>
+                        </m:r>
+                      </m:e>
+                      <m:sub>
+                        <m:r>
+                          <a:rPr lang="en-US" sz="800" b="0" i="1" smtClean="0">
+                            <a:latin typeface="Cambria Math" panose="02040503050406030204" pitchFamily="18" charset="0"/>
+                          </a:rPr>
+                          <m:t>𝐷</m:t>
+                        </m:r>
+                      </m:sub>
+                    </m:sSub>
+                    <m:r>
+                      <a:rPr lang="en-US" sz="800" b="0" i="1" smtClean="0">
+                        <a:latin typeface="Cambria Math" panose="02040503050406030204" pitchFamily="18" charset="0"/>
+                      </a:rPr>
+                      <m:t>=1.5</m:t>
+                    </m:r>
+                  </m:oMath>
+                </a14:m>
+                <a:endParaRPr lang="en-US" sz="800" dirty="0"/>
+              </a:p>
+            </p:txBody>
+          </p:sp>
+        </mc:Choice>
+        <mc:Fallback xmlns="">
+          <p:sp>
+            <p:nvSpPr>
+              <p:cNvPr id="31" name="TextBox 30">
+                <a:extLst>
+                  <a:ext uri="{FF2B5EF4-FFF2-40B4-BE49-F238E27FC236}">
+                    <a16:creationId xmlns:a16="http://schemas.microsoft.com/office/drawing/2014/main" id="{2D2CB2CE-E7C9-0F25-0E02-7B967DE8C336}"/>
+                  </a:ext>
+                </a:extLst>
+              </p:cNvPr>
+              <p:cNvSpPr txBox="1">
+                <a:spLocks noRot="1" noChangeAspect="1" noMove="1" noResize="1" noEditPoints="1" noAdjustHandles="1" noChangeArrowheads="1" noChangeShapeType="1" noTextEdit="1"/>
+              </p:cNvSpPr>
+              <p:nvPr/>
+            </p:nvSpPr>
+            <p:spPr>
+              <a:xfrm>
+                <a:off x="4163296" y="21858"/>
+                <a:ext cx="1521442" cy="215444"/>
+              </a:xfrm>
+              <a:prstGeom prst="rect">
+                <a:avLst/>
+              </a:prstGeom>
+              <a:blipFill>
+                <a:blip r:embed="rId6"/>
+                <a:stretch>
+                  <a:fillRect b="-8571"/>
+                </a:stretch>
+              </a:blipFill>
+            </p:spPr>
+            <p:txBody>
+              <a:bodyPr/>
+              <a:lstStyle/>
+              <a:p>
+                <a:r>
+                  <a:rPr lang="en-US">
+                    <a:noFill/>
+                  </a:rPr>
+                  <a:t> </a:t>
+                </a:r>
+              </a:p>
+            </p:txBody>
+          </p:sp>
+        </mc:Fallback>
+      </mc:AlternateContent>
+      <p:sp>
+        <p:nvSpPr>
+          <p:cNvPr id="32" name="Rectangle 31">
+            <a:extLst>
+              <a:ext uri="{FF2B5EF4-FFF2-40B4-BE49-F238E27FC236}">
+                <a16:creationId xmlns:a16="http://schemas.microsoft.com/office/drawing/2014/main" id="{8B8EF035-1B91-FFF2-A899-52087603EA54}"/>
+              </a:ext>
+            </a:extLst>
+          </p:cNvPr>
+          <p:cNvSpPr/>
+          <p:nvPr/>
+        </p:nvSpPr>
+        <p:spPr>
+          <a:xfrm>
+            <a:off x="6012103" y="33371"/>
+            <a:ext cx="1449800" cy="182011"/>
+          </a:xfrm>
+          <a:prstGeom prst="rect">
+            <a:avLst/>
+          </a:prstGeom>
+          <a:solidFill>
+            <a:schemeClr val="bg2">
+              <a:lumMod val="90000"/>
+            </a:schemeClr>
+          </a:solidFill>
+          <a:ln>
+            <a:solidFill>
+              <a:schemeClr val="tx1"/>
+            </a:solidFill>
+          </a:ln>
+        </p:spPr>
+        <p:style>
+          <a:lnRef idx="2">
+            <a:schemeClr val="accent1">
+              <a:shade val="15000"/>
+            </a:schemeClr>
+          </a:lnRef>
+          <a:fillRef idx="1">
+            <a:schemeClr val="accent1"/>
+          </a:fillRef>
+          <a:effectRef idx="0">
+            <a:schemeClr val="accent1"/>
+          </a:effectRef>
+          <a:fontRef idx="minor">
+            <a:schemeClr val="lt1"/>
+          </a:fontRef>
+        </p:style>
+        <p:txBody>
+          <a:bodyPr rtlCol="0" anchor="ctr"/>
+          <a:lstStyle/>
+          <a:p>
+            <a:pPr algn="ctr"/>
+            <a:endParaRPr lang="en-US"/>
+          </a:p>
+        </p:txBody>
+      </p:sp>
+      <mc:AlternateContent xmlns:mc="http://schemas.openxmlformats.org/markup-compatibility/2006">
+        <mc:Choice xmlns:a14="http://schemas.microsoft.com/office/drawing/2010/main" Requires="a14">
+          <p:sp>
+            <p:nvSpPr>
+              <p:cNvPr id="33" name="TextBox 32">
+                <a:extLst>
+                  <a:ext uri="{FF2B5EF4-FFF2-40B4-BE49-F238E27FC236}">
+                    <a16:creationId xmlns:a16="http://schemas.microsoft.com/office/drawing/2014/main" id="{3C59010C-BC70-58ED-5005-8BAFE4793522}"/>
+                  </a:ext>
+                </a:extLst>
+              </p:cNvPr>
+              <p:cNvSpPr txBox="1"/>
+              <p:nvPr/>
+            </p:nvSpPr>
+            <p:spPr>
+              <a:xfrm>
+                <a:off x="5986703" y="24922"/>
+                <a:ext cx="1543884" cy="215444"/>
+              </a:xfrm>
+              <a:prstGeom prst="rect">
+                <a:avLst/>
+              </a:prstGeom>
+              <a:noFill/>
+            </p:spPr>
+            <p:txBody>
+              <a:bodyPr wrap="none" rtlCol="0">
+                <a:spAutoFit/>
+              </a:bodyPr>
+              <a:lstStyle/>
+              <a:p>
+                <a:r>
+                  <a:rPr lang="en-US" sz="800" dirty="0">
+                    <a:latin typeface="Arial" panose="020B0604020202020204" pitchFamily="34" charset="0"/>
+                    <a:cs typeface="Arial" panose="020B0604020202020204" pitchFamily="34" charset="0"/>
+                  </a:rPr>
+                  <a:t>High autocorrelation; </a:t>
+                </a:r>
+                <a14:m>
+                  <m:oMath xmlns:m="http://schemas.openxmlformats.org/officeDocument/2006/math">
+                    <m:sSub>
+                      <m:sSubPr>
+                        <m:ctrlPr>
+                          <a:rPr lang="en-US" sz="800" b="0" i="1" smtClean="0">
+                            <a:latin typeface="Cambria Math" panose="02040503050406030204" pitchFamily="18" charset="0"/>
+                          </a:rPr>
+                        </m:ctrlPr>
+                      </m:sSubPr>
+                      <m:e>
+                        <m:r>
+                          <a:rPr lang="en-US" sz="800" b="0" i="1" smtClean="0">
+                            <a:latin typeface="Cambria Math" panose="02040503050406030204" pitchFamily="18" charset="0"/>
+                          </a:rPr>
+                          <m:t>𝜎</m:t>
+                        </m:r>
+                      </m:e>
+                      <m:sub>
+                        <m:r>
+                          <a:rPr lang="en-US" sz="800" b="0" i="1" smtClean="0">
+                            <a:latin typeface="Cambria Math" panose="02040503050406030204" pitchFamily="18" charset="0"/>
+                          </a:rPr>
+                          <m:t>𝐷</m:t>
+                        </m:r>
+                      </m:sub>
+                    </m:sSub>
+                    <m:r>
+                      <a:rPr lang="en-US" sz="800" b="0" i="1" smtClean="0">
+                        <a:latin typeface="Cambria Math" panose="02040503050406030204" pitchFamily="18" charset="0"/>
+                      </a:rPr>
+                      <m:t>=1.5</m:t>
+                    </m:r>
+                  </m:oMath>
+                </a14:m>
+                <a:endParaRPr lang="en-US" sz="800" dirty="0"/>
+              </a:p>
+            </p:txBody>
+          </p:sp>
+        </mc:Choice>
+        <mc:Fallback>
+          <p:sp>
+            <p:nvSpPr>
+              <p:cNvPr id="33" name="TextBox 32">
+                <a:extLst>
+                  <a:ext uri="{FF2B5EF4-FFF2-40B4-BE49-F238E27FC236}">
+                    <a16:creationId xmlns:a16="http://schemas.microsoft.com/office/drawing/2014/main" id="{3C59010C-BC70-58ED-5005-8BAFE4793522}"/>
+                  </a:ext>
+                </a:extLst>
+              </p:cNvPr>
+              <p:cNvSpPr txBox="1">
+                <a:spLocks noRot="1" noChangeAspect="1" noMove="1" noResize="1" noEditPoints="1" noAdjustHandles="1" noChangeArrowheads="1" noChangeShapeType="1" noTextEdit="1"/>
+              </p:cNvSpPr>
+              <p:nvPr/>
+            </p:nvSpPr>
+            <p:spPr>
+              <a:xfrm>
+                <a:off x="5986703" y="24922"/>
+                <a:ext cx="1543884" cy="215444"/>
+              </a:xfrm>
+              <a:prstGeom prst="rect">
+                <a:avLst/>
+              </a:prstGeom>
+              <a:blipFill>
+                <a:blip r:embed="rId7"/>
+                <a:stretch>
+                  <a:fillRect b="-8571"/>
+                </a:stretch>
+              </a:blipFill>
+            </p:spPr>
+            <p:txBody>
+              <a:bodyPr/>
+              <a:lstStyle/>
+              <a:p>
+                <a:r>
+                  <a:rPr lang="en-US">
+                    <a:noFill/>
+                  </a:rPr>
+                  <a:t> </a:t>
+                </a:r>
+              </a:p>
+            </p:txBody>
+          </p:sp>
+        </mc:Fallback>
+      </mc:AlternateContent>
     </p:spTree>
     <p:extLst>
       <p:ext uri="{BB962C8B-B14F-4D97-AF65-F5344CB8AC3E}">

</xml_diff>